<commit_message>
feat: add presentation generation, voice 2.0 visuals, and update task status
</commit_message>
<xml_diff>
--- a/frontend/public/downloads/In_Home_Presentation.pptx
+++ b/frontend/public/downloads/In_Home_Presentation.pptx
@@ -10,9 +10,15 @@
     <p:sldId id="258" r:id="rId4"/>
     <p:sldId id="259" r:id="rId5"/>
     <p:sldId id="260" r:id="rId6"/>
+    <p:sldId id="261" r:id="rId7"/>
+    <p:sldId id="262" r:id="rId8"/>
+    <p:sldId id="263" r:id="rId9"/>
+    <p:sldId id="264" r:id="rId10"/>
+    <p:sldId id="265" r:id="rId11"/>
+    <p:sldId id="266" r:id="rId12"/>
   </p:sldIdLst>
   <p:notesMasterIdLst>
-    <p:notesMasterId r:id="rId7"/>
+    <p:notesMasterId r:id="rId13"/>
   </p:notesMasterIdLst>
   <p:sldSz cx="9144000" cy="5143500"/>
   <p:notesSz cx="5143500" cy="9144000"/>
@@ -548,6 +554,182 @@
 </p:notes>
 </file>
 
+<file path=ppt/notesSlides/notesSlide10.xml><?xml version="1.0" encoding="utf-8"?>
+<p:notes xmlns:a="http://schemas.openxmlformats.org/drawingml/2006/main" xmlns:r="http://schemas.openxmlformats.org/officeDocument/2006/relationships" xmlns:p="http://schemas.openxmlformats.org/presentationml/2006/main">
+  <p:cSld>
+    <p:spTree>
+      <p:nvGrpSpPr>
+        <p:cNvPr id="1" name=""/>
+        <p:cNvGrpSpPr/>
+        <p:nvPr/>
+      </p:nvGrpSpPr>
+      <p:grpSpPr>
+        <a:xfrm>
+          <a:off x="0" y="0"/>
+          <a:ext cx="0" cy="0"/>
+          <a:chOff x="0" y="0"/>
+          <a:chExt cx="0" cy="0"/>
+        </a:xfrm>
+      </p:grpSpPr>
+      <p:sp>
+        <p:nvSpPr>
+          <p:cNvPr id="2" name="Slide Image Placeholder 1"/>
+          <p:cNvSpPr>
+            <a:spLocks noGrp="1" noRot="1" noChangeAspect="1"/>
+          </p:cNvSpPr>
+          <p:nvPr>
+            <p:ph type="sldImg"/>
+          </p:nvPr>
+        </p:nvSpPr>
+        <p:spPr/>
+      </p:sp>
+      <p:sp>
+        <p:nvSpPr>
+          <p:cNvPr id="3" name="Notes Placeholder 2"/>
+          <p:cNvSpPr>
+            <a:spLocks noGrp="1"/>
+          </p:cNvSpPr>
+          <p:nvPr>
+            <p:ph type="body" idx="1"/>
+          </p:nvPr>
+        </p:nvSpPr>
+        <p:spPr/>
+        <p:txBody>
+          <a:bodyPr/>
+          <a:lstStyle/>
+          <a:p>
+            <a:r>
+              <a:rPr lang="en-US" dirty="0"/>
+              <a:t/>
+            </a:r>
+            <a:endParaRPr lang="en-US" dirty="0"/>
+          </a:p>
+        </p:txBody>
+      </p:sp>
+      <p:sp>
+        <p:nvSpPr>
+          <p:cNvPr id="4" name="Slide Number Placeholder 3"/>
+          <p:cNvSpPr>
+            <a:spLocks noGrp="1"/>
+          </p:cNvSpPr>
+          <p:nvPr>
+            <p:ph type="sldNum" sz="quarter" idx="10"/>
+          </p:nvPr>
+        </p:nvSpPr>
+        <p:spPr/>
+        <p:txBody>
+          <a:bodyPr/>
+          <a:lstStyle/>
+          <a:p>
+            <a:fld id="{F7021451-1387-4CA6-816F-3879F97B5CBC}" type="slidenum">
+              <a:rPr lang="en-US"/>
+              <a:t>10</a:t>
+            </a:fld>
+            <a:endParaRPr lang="en-US"/>
+          </a:p>
+        </p:txBody>
+      </p:sp>
+    </p:spTree>
+    <p:extLst>
+      <p:ext uri="{BB962C8B-B14F-4D97-AF65-F5344CB8AC3E}">
+        <p14:creationId xmlns:p14="http://schemas.microsoft.com/office/powerpoint/2010/main" val="1024086991"/>
+      </p:ext>
+    </p:extLst>
+  </p:cSld>
+  <p:clrMapOvr>
+    <a:masterClrMapping/>
+  </p:clrMapOvr>
+</p:notes>
+</file>
+
+<file path=ppt/notesSlides/notesSlide11.xml><?xml version="1.0" encoding="utf-8"?>
+<p:notes xmlns:a="http://schemas.openxmlformats.org/drawingml/2006/main" xmlns:r="http://schemas.openxmlformats.org/officeDocument/2006/relationships" xmlns:p="http://schemas.openxmlformats.org/presentationml/2006/main">
+  <p:cSld>
+    <p:spTree>
+      <p:nvGrpSpPr>
+        <p:cNvPr id="1" name=""/>
+        <p:cNvGrpSpPr/>
+        <p:nvPr/>
+      </p:nvGrpSpPr>
+      <p:grpSpPr>
+        <a:xfrm>
+          <a:off x="0" y="0"/>
+          <a:ext cx="0" cy="0"/>
+          <a:chOff x="0" y="0"/>
+          <a:chExt cx="0" cy="0"/>
+        </a:xfrm>
+      </p:grpSpPr>
+      <p:sp>
+        <p:nvSpPr>
+          <p:cNvPr id="2" name="Slide Image Placeholder 1"/>
+          <p:cNvSpPr>
+            <a:spLocks noGrp="1" noRot="1" noChangeAspect="1"/>
+          </p:cNvSpPr>
+          <p:nvPr>
+            <p:ph type="sldImg"/>
+          </p:nvPr>
+        </p:nvSpPr>
+        <p:spPr/>
+      </p:sp>
+      <p:sp>
+        <p:nvSpPr>
+          <p:cNvPr id="3" name="Notes Placeholder 2"/>
+          <p:cNvSpPr>
+            <a:spLocks noGrp="1"/>
+          </p:cNvSpPr>
+          <p:nvPr>
+            <p:ph type="body" idx="1"/>
+          </p:nvPr>
+        </p:nvSpPr>
+        <p:spPr/>
+        <p:txBody>
+          <a:bodyPr/>
+          <a:lstStyle/>
+          <a:p>
+            <a:r>
+              <a:rPr lang="en-US" dirty="0"/>
+              <a:t/>
+            </a:r>
+            <a:endParaRPr lang="en-US" dirty="0"/>
+          </a:p>
+        </p:txBody>
+      </p:sp>
+      <p:sp>
+        <p:nvSpPr>
+          <p:cNvPr id="4" name="Slide Number Placeholder 3"/>
+          <p:cNvSpPr>
+            <a:spLocks noGrp="1"/>
+          </p:cNvSpPr>
+          <p:nvPr>
+            <p:ph type="sldNum" sz="quarter" idx="10"/>
+          </p:nvPr>
+        </p:nvSpPr>
+        <p:spPr/>
+        <p:txBody>
+          <a:bodyPr/>
+          <a:lstStyle/>
+          <a:p>
+            <a:fld id="{F7021451-1387-4CA6-816F-3879F97B5CBC}" type="slidenum">
+              <a:rPr lang="en-US"/>
+              <a:t>11</a:t>
+            </a:fld>
+            <a:endParaRPr lang="en-US"/>
+          </a:p>
+        </p:txBody>
+      </p:sp>
+    </p:spTree>
+    <p:extLst>
+      <p:ext uri="{BB962C8B-B14F-4D97-AF65-F5344CB8AC3E}">
+        <p14:creationId xmlns:p14="http://schemas.microsoft.com/office/powerpoint/2010/main" val="1024086991"/>
+      </p:ext>
+    </p:extLst>
+  </p:cSld>
+  <p:clrMapOvr>
+    <a:masterClrMapping/>
+  </p:clrMapOvr>
+</p:notes>
+</file>
+
 <file path=ppt/notesSlides/notesSlide2.xml><?xml version="1.0" encoding="utf-8"?>
 <p:notes xmlns:a="http://schemas.openxmlformats.org/drawingml/2006/main" xmlns:r="http://schemas.openxmlformats.org/officeDocument/2006/relationships" xmlns:p="http://schemas.openxmlformats.org/presentationml/2006/main">
   <p:cSld>
@@ -882,6 +1064,358 @@
             <a:fld id="{F7021451-1387-4CA6-816F-3879F97B5CBC}" type="slidenum">
               <a:rPr lang="en-US"/>
               <a:t>5</a:t>
+            </a:fld>
+            <a:endParaRPr lang="en-US"/>
+          </a:p>
+        </p:txBody>
+      </p:sp>
+    </p:spTree>
+    <p:extLst>
+      <p:ext uri="{BB962C8B-B14F-4D97-AF65-F5344CB8AC3E}">
+        <p14:creationId xmlns:p14="http://schemas.microsoft.com/office/powerpoint/2010/main" val="1024086991"/>
+      </p:ext>
+    </p:extLst>
+  </p:cSld>
+  <p:clrMapOvr>
+    <a:masterClrMapping/>
+  </p:clrMapOvr>
+</p:notes>
+</file>
+
+<file path=ppt/notesSlides/notesSlide6.xml><?xml version="1.0" encoding="utf-8"?>
+<p:notes xmlns:a="http://schemas.openxmlformats.org/drawingml/2006/main" xmlns:r="http://schemas.openxmlformats.org/officeDocument/2006/relationships" xmlns:p="http://schemas.openxmlformats.org/presentationml/2006/main">
+  <p:cSld>
+    <p:spTree>
+      <p:nvGrpSpPr>
+        <p:cNvPr id="1" name=""/>
+        <p:cNvGrpSpPr/>
+        <p:nvPr/>
+      </p:nvGrpSpPr>
+      <p:grpSpPr>
+        <a:xfrm>
+          <a:off x="0" y="0"/>
+          <a:ext cx="0" cy="0"/>
+          <a:chOff x="0" y="0"/>
+          <a:chExt cx="0" cy="0"/>
+        </a:xfrm>
+      </p:grpSpPr>
+      <p:sp>
+        <p:nvSpPr>
+          <p:cNvPr id="2" name="Slide Image Placeholder 1"/>
+          <p:cNvSpPr>
+            <a:spLocks noGrp="1" noRot="1" noChangeAspect="1"/>
+          </p:cNvSpPr>
+          <p:nvPr>
+            <p:ph type="sldImg"/>
+          </p:nvPr>
+        </p:nvSpPr>
+        <p:spPr/>
+      </p:sp>
+      <p:sp>
+        <p:nvSpPr>
+          <p:cNvPr id="3" name="Notes Placeholder 2"/>
+          <p:cNvSpPr>
+            <a:spLocks noGrp="1"/>
+          </p:cNvSpPr>
+          <p:nvPr>
+            <p:ph type="body" idx="1"/>
+          </p:nvPr>
+        </p:nvSpPr>
+        <p:spPr/>
+        <p:txBody>
+          <a:bodyPr/>
+          <a:lstStyle/>
+          <a:p>
+            <a:r>
+              <a:rPr lang="en-US" dirty="0"/>
+              <a:t/>
+            </a:r>
+            <a:endParaRPr lang="en-US" dirty="0"/>
+          </a:p>
+        </p:txBody>
+      </p:sp>
+      <p:sp>
+        <p:nvSpPr>
+          <p:cNvPr id="4" name="Slide Number Placeholder 3"/>
+          <p:cNvSpPr>
+            <a:spLocks noGrp="1"/>
+          </p:cNvSpPr>
+          <p:nvPr>
+            <p:ph type="sldNum" sz="quarter" idx="10"/>
+          </p:nvPr>
+        </p:nvSpPr>
+        <p:spPr/>
+        <p:txBody>
+          <a:bodyPr/>
+          <a:lstStyle/>
+          <a:p>
+            <a:fld id="{F7021451-1387-4CA6-816F-3879F97B5CBC}" type="slidenum">
+              <a:rPr lang="en-US"/>
+              <a:t>6</a:t>
+            </a:fld>
+            <a:endParaRPr lang="en-US"/>
+          </a:p>
+        </p:txBody>
+      </p:sp>
+    </p:spTree>
+    <p:extLst>
+      <p:ext uri="{BB962C8B-B14F-4D97-AF65-F5344CB8AC3E}">
+        <p14:creationId xmlns:p14="http://schemas.microsoft.com/office/powerpoint/2010/main" val="1024086991"/>
+      </p:ext>
+    </p:extLst>
+  </p:cSld>
+  <p:clrMapOvr>
+    <a:masterClrMapping/>
+  </p:clrMapOvr>
+</p:notes>
+</file>
+
+<file path=ppt/notesSlides/notesSlide7.xml><?xml version="1.0" encoding="utf-8"?>
+<p:notes xmlns:a="http://schemas.openxmlformats.org/drawingml/2006/main" xmlns:r="http://schemas.openxmlformats.org/officeDocument/2006/relationships" xmlns:p="http://schemas.openxmlformats.org/presentationml/2006/main">
+  <p:cSld>
+    <p:spTree>
+      <p:nvGrpSpPr>
+        <p:cNvPr id="1" name=""/>
+        <p:cNvGrpSpPr/>
+        <p:nvPr/>
+      </p:nvGrpSpPr>
+      <p:grpSpPr>
+        <a:xfrm>
+          <a:off x="0" y="0"/>
+          <a:ext cx="0" cy="0"/>
+          <a:chOff x="0" y="0"/>
+          <a:chExt cx="0" cy="0"/>
+        </a:xfrm>
+      </p:grpSpPr>
+      <p:sp>
+        <p:nvSpPr>
+          <p:cNvPr id="2" name="Slide Image Placeholder 1"/>
+          <p:cNvSpPr>
+            <a:spLocks noGrp="1" noRot="1" noChangeAspect="1"/>
+          </p:cNvSpPr>
+          <p:nvPr>
+            <p:ph type="sldImg"/>
+          </p:nvPr>
+        </p:nvSpPr>
+        <p:spPr/>
+      </p:sp>
+      <p:sp>
+        <p:nvSpPr>
+          <p:cNvPr id="3" name="Notes Placeholder 2"/>
+          <p:cNvSpPr>
+            <a:spLocks noGrp="1"/>
+          </p:cNvSpPr>
+          <p:nvPr>
+            <p:ph type="body" idx="1"/>
+          </p:nvPr>
+        </p:nvSpPr>
+        <p:spPr/>
+        <p:txBody>
+          <a:bodyPr/>
+          <a:lstStyle/>
+          <a:p>
+            <a:r>
+              <a:rPr lang="en-US" dirty="0"/>
+              <a:t/>
+            </a:r>
+            <a:endParaRPr lang="en-US" dirty="0"/>
+          </a:p>
+        </p:txBody>
+      </p:sp>
+      <p:sp>
+        <p:nvSpPr>
+          <p:cNvPr id="4" name="Slide Number Placeholder 3"/>
+          <p:cNvSpPr>
+            <a:spLocks noGrp="1"/>
+          </p:cNvSpPr>
+          <p:nvPr>
+            <p:ph type="sldNum" sz="quarter" idx="10"/>
+          </p:nvPr>
+        </p:nvSpPr>
+        <p:spPr/>
+        <p:txBody>
+          <a:bodyPr/>
+          <a:lstStyle/>
+          <a:p>
+            <a:fld id="{F7021451-1387-4CA6-816F-3879F97B5CBC}" type="slidenum">
+              <a:rPr lang="en-US"/>
+              <a:t>7</a:t>
+            </a:fld>
+            <a:endParaRPr lang="en-US"/>
+          </a:p>
+        </p:txBody>
+      </p:sp>
+    </p:spTree>
+    <p:extLst>
+      <p:ext uri="{BB962C8B-B14F-4D97-AF65-F5344CB8AC3E}">
+        <p14:creationId xmlns:p14="http://schemas.microsoft.com/office/powerpoint/2010/main" val="1024086991"/>
+      </p:ext>
+    </p:extLst>
+  </p:cSld>
+  <p:clrMapOvr>
+    <a:masterClrMapping/>
+  </p:clrMapOvr>
+</p:notes>
+</file>
+
+<file path=ppt/notesSlides/notesSlide8.xml><?xml version="1.0" encoding="utf-8"?>
+<p:notes xmlns:a="http://schemas.openxmlformats.org/drawingml/2006/main" xmlns:r="http://schemas.openxmlformats.org/officeDocument/2006/relationships" xmlns:p="http://schemas.openxmlformats.org/presentationml/2006/main">
+  <p:cSld>
+    <p:spTree>
+      <p:nvGrpSpPr>
+        <p:cNvPr id="1" name=""/>
+        <p:cNvGrpSpPr/>
+        <p:nvPr/>
+      </p:nvGrpSpPr>
+      <p:grpSpPr>
+        <a:xfrm>
+          <a:off x="0" y="0"/>
+          <a:ext cx="0" cy="0"/>
+          <a:chOff x="0" y="0"/>
+          <a:chExt cx="0" cy="0"/>
+        </a:xfrm>
+      </p:grpSpPr>
+      <p:sp>
+        <p:nvSpPr>
+          <p:cNvPr id="2" name="Slide Image Placeholder 1"/>
+          <p:cNvSpPr>
+            <a:spLocks noGrp="1" noRot="1" noChangeAspect="1"/>
+          </p:cNvSpPr>
+          <p:nvPr>
+            <p:ph type="sldImg"/>
+          </p:nvPr>
+        </p:nvSpPr>
+        <p:spPr/>
+      </p:sp>
+      <p:sp>
+        <p:nvSpPr>
+          <p:cNvPr id="3" name="Notes Placeholder 2"/>
+          <p:cNvSpPr>
+            <a:spLocks noGrp="1"/>
+          </p:cNvSpPr>
+          <p:nvPr>
+            <p:ph type="body" idx="1"/>
+          </p:nvPr>
+        </p:nvSpPr>
+        <p:spPr/>
+        <p:txBody>
+          <a:bodyPr/>
+          <a:lstStyle/>
+          <a:p>
+            <a:r>
+              <a:rPr lang="en-US" dirty="0"/>
+              <a:t/>
+            </a:r>
+            <a:endParaRPr lang="en-US" dirty="0"/>
+          </a:p>
+        </p:txBody>
+      </p:sp>
+      <p:sp>
+        <p:nvSpPr>
+          <p:cNvPr id="4" name="Slide Number Placeholder 3"/>
+          <p:cNvSpPr>
+            <a:spLocks noGrp="1"/>
+          </p:cNvSpPr>
+          <p:nvPr>
+            <p:ph type="sldNum" sz="quarter" idx="10"/>
+          </p:nvPr>
+        </p:nvSpPr>
+        <p:spPr/>
+        <p:txBody>
+          <a:bodyPr/>
+          <a:lstStyle/>
+          <a:p>
+            <a:fld id="{F7021451-1387-4CA6-816F-3879F97B5CBC}" type="slidenum">
+              <a:rPr lang="en-US"/>
+              <a:t>8</a:t>
+            </a:fld>
+            <a:endParaRPr lang="en-US"/>
+          </a:p>
+        </p:txBody>
+      </p:sp>
+    </p:spTree>
+    <p:extLst>
+      <p:ext uri="{BB962C8B-B14F-4D97-AF65-F5344CB8AC3E}">
+        <p14:creationId xmlns:p14="http://schemas.microsoft.com/office/powerpoint/2010/main" val="1024086991"/>
+      </p:ext>
+    </p:extLst>
+  </p:cSld>
+  <p:clrMapOvr>
+    <a:masterClrMapping/>
+  </p:clrMapOvr>
+</p:notes>
+</file>
+
+<file path=ppt/notesSlides/notesSlide9.xml><?xml version="1.0" encoding="utf-8"?>
+<p:notes xmlns:a="http://schemas.openxmlformats.org/drawingml/2006/main" xmlns:r="http://schemas.openxmlformats.org/officeDocument/2006/relationships" xmlns:p="http://schemas.openxmlformats.org/presentationml/2006/main">
+  <p:cSld>
+    <p:spTree>
+      <p:nvGrpSpPr>
+        <p:cNvPr id="1" name=""/>
+        <p:cNvGrpSpPr/>
+        <p:nvPr/>
+      </p:nvGrpSpPr>
+      <p:grpSpPr>
+        <a:xfrm>
+          <a:off x="0" y="0"/>
+          <a:ext cx="0" cy="0"/>
+          <a:chOff x="0" y="0"/>
+          <a:chExt cx="0" cy="0"/>
+        </a:xfrm>
+      </p:grpSpPr>
+      <p:sp>
+        <p:nvSpPr>
+          <p:cNvPr id="2" name="Slide Image Placeholder 1"/>
+          <p:cNvSpPr>
+            <a:spLocks noGrp="1" noRot="1" noChangeAspect="1"/>
+          </p:cNvSpPr>
+          <p:nvPr>
+            <p:ph type="sldImg"/>
+          </p:nvPr>
+        </p:nvSpPr>
+        <p:spPr/>
+      </p:sp>
+      <p:sp>
+        <p:nvSpPr>
+          <p:cNvPr id="3" name="Notes Placeholder 2"/>
+          <p:cNvSpPr>
+            <a:spLocks noGrp="1"/>
+          </p:cNvSpPr>
+          <p:nvPr>
+            <p:ph type="body" idx="1"/>
+          </p:nvPr>
+        </p:nvSpPr>
+        <p:spPr/>
+        <p:txBody>
+          <a:bodyPr/>
+          <a:lstStyle/>
+          <a:p>
+            <a:r>
+              <a:rPr lang="en-US" dirty="0"/>
+              <a:t/>
+            </a:r>
+            <a:endParaRPr lang="en-US" dirty="0"/>
+          </a:p>
+        </p:txBody>
+      </p:sp>
+      <p:sp>
+        <p:nvSpPr>
+          <p:cNvPr id="4" name="Slide Number Placeholder 3"/>
+          <p:cNvSpPr>
+            <a:spLocks noGrp="1"/>
+          </p:cNvSpPr>
+          <p:nvPr>
+            <p:ph type="sldNum" sz="quarter" idx="10"/>
+          </p:nvPr>
+        </p:nvSpPr>
+        <p:spPr/>
+        <p:txBody>
+          <a:bodyPr/>
+          <a:lstStyle/>
+          <a:p>
+            <a:fld id="{F7021451-1387-4CA6-816F-3879F97B5CBC}" type="slidenum">
+              <a:rPr lang="en-US"/>
+              <a:t>9</a:t>
             </a:fld>
             <a:endParaRPr lang="en-US"/>
           </a:p>
@@ -1239,8 +1773,8 @@
         </p:nvSpPr>
         <p:spPr>
           <a:xfrm>
-            <a:off x="844451" y="1458367"/>
-            <a:ext cx="7604049" cy="676275"/>
+            <a:off x="769901" y="1119634"/>
+            <a:ext cx="7604049" cy="1352550"/>
           </a:xfrm>
           <a:prstGeom prst="rect">
             <a:avLst/>
@@ -1252,7 +1786,7 @@
           <a:bodyPr wrap="square" lIns="0" tIns="0" rIns="0" bIns="0" rtlCol="0" anchor="t"/>
           <a:lstStyle/>
           <a:p>
-            <a:pPr algn="l" indent="0" marL="0">
+            <a:pPr algn="ctr" indent="0" marL="0">
               <a:spcBef>
                 <a:spcPts val="2948"/>
               </a:spcBef>
@@ -1262,7 +1796,7 @@
               <a:buNone/>
             </a:pPr>
             <a:r>
-              <a:rPr lang="en-US" sz="4400" b="1" dirty="0">
+              <a:rPr lang="en-US" sz="4400" dirty="0">
                 <a:solidFill>
                   <a:srgbClr val="F6AD55"/>
                 </a:solidFill>
@@ -1274,6 +1808,29 @@
             </a:r>
             <a:endParaRPr lang="en-US" sz="4400" dirty="0"/>
           </a:p>
+          <a:p>
+            <a:pPr algn="ctr" indent="0" marL="0">
+              <a:spcBef>
+                <a:spcPts val="2948"/>
+              </a:spcBef>
+              <a:spcAft>
+                <a:spcPts val="2000"/>
+              </a:spcAft>
+              <a:buNone/>
+            </a:pPr>
+            <a:r>
+              <a:rPr lang="en-US" sz="4400" dirty="0">
+                <a:solidFill>
+                  <a:srgbClr val="F6AD55"/>
+                </a:solidFill>
+                <a:latin typeface="Arial" pitchFamily="34" charset="0"/>
+                <a:ea typeface="Arial" pitchFamily="34" charset="-122"/>
+                <a:cs typeface="Arial" pitchFamily="34" charset="-120"/>
+              </a:rPr>
+              <a:t>PROGRAM</a:t>
+            </a:r>
+            <a:endParaRPr lang="en-US" sz="4400" dirty="0"/>
+          </a:p>
         </p:txBody>
       </p:sp>
       <p:sp>
@@ -1284,7 +1841,7 @@
         </p:nvSpPr>
         <p:spPr>
           <a:xfrm>
-            <a:off x="3936950" y="2769543"/>
+            <a:off x="3936950" y="3107085"/>
             <a:ext cx="1269950" cy="50750"/>
           </a:xfrm>
           <a:prstGeom prst="rect">
@@ -1314,8 +1871,8 @@
         </p:nvSpPr>
         <p:spPr>
           <a:xfrm>
-            <a:off x="2433638" y="3454152"/>
-            <a:ext cx="4362260" cy="352425"/>
+            <a:off x="3076575" y="3792736"/>
+            <a:ext cx="3050667" cy="352425"/>
           </a:xfrm>
           <a:prstGeom prst="rect">
             <a:avLst/>
@@ -1329,23 +1886,1255 @@
           <a:p>
             <a:pPr algn="l" indent="0" marL="0">
               <a:spcBef>
+                <a:spcPts val="2000"/>
+              </a:spcBef>
+              <a:spcAft>
                 <a:spcPts val="1992"/>
+              </a:spcAft>
+              <a:buNone/>
+            </a:pPr>
+            <a:r>
+              <a:rPr lang="en-US" sz="2400" dirty="0">
+                <a:solidFill>
+                  <a:srgbClr val="E2E8F0"/>
+                </a:solidFill>
+                <a:latin typeface="Arial" pitchFamily="34" charset="0"/>
+                <a:ea typeface="Arial" pitchFamily="34" charset="-122"/>
+                <a:cs typeface="Arial" pitchFamily="34" charset="-120"/>
+              </a:rPr>
+              <a:t>Take Back Your Power</a:t>
+            </a:r>
+            <a:endParaRPr lang="en-US" sz="2400" dirty="0"/>
+          </a:p>
+        </p:txBody>
+      </p:sp>
+    </p:spTree>
+  </p:cSld>
+  <p:clrMapOvr>
+    <a:masterClrMapping/>
+  </p:clrMapOvr>
+</p:sld>
+</file>
+
+<file path=ppt/slides/slide10.xml><?xml version="1.0" encoding="utf-8"?>
+<p:sld xmlns:a="http://schemas.openxmlformats.org/drawingml/2006/main" xmlns:r="http://schemas.openxmlformats.org/officeDocument/2006/relationships" xmlns:p="http://schemas.openxmlformats.org/presentationml/2006/main">
+  <p:cSld name="Slide 10">
+    <p:bg>
+      <p:bgPr>
+        <a:solidFill>
+          <a:srgbClr val="1A202C"/>
+        </a:solidFill>
+      </p:bgPr>
+    </p:bg>
+    <p:spTree>
+      <p:nvGrpSpPr>
+        <p:cNvPr id="1" name=""/>
+        <p:cNvGrpSpPr/>
+        <p:nvPr/>
+      </p:nvGrpSpPr>
+      <p:grpSpPr>
+        <a:xfrm>
+          <a:off x="0" y="0"/>
+          <a:ext cx="0" cy="0"/>
+          <a:chOff x="0" y="0"/>
+          <a:chExt cx="0" cy="0"/>
+        </a:xfrm>
+      </p:grpSpPr>
+      <p:sp>
+        <p:nvSpPr>
+          <p:cNvPr id="2" name="Text 0"/>
+          <p:cNvSpPr/>
+          <p:nvPr/>
+        </p:nvSpPr>
+        <p:spPr>
+          <a:xfrm>
+            <a:off x="-91440" y="381000"/>
+            <a:ext cx="9326880" cy="495300"/>
+          </a:xfrm>
+          <a:prstGeom prst="rect">
+            <a:avLst/>
+          </a:prstGeom>
+          <a:noFill/>
+          <a:ln/>
+        </p:spPr>
+        <p:txBody>
+          <a:bodyPr wrap="square" lIns="0" tIns="0" rIns="0" bIns="0" rtlCol="0" anchor="t"/>
+          <a:lstStyle/>
+          <a:p>
+            <a:pPr algn="ctr" indent="0" marL="0">
+              <a:spcBef>
+                <a:spcPts val="3000"/>
               </a:spcBef>
               <a:spcAft>
-                <a:spcPts val="1992"/>
+                <a:spcPts val="3000"/>
+              </a:spcAft>
+              <a:buNone/>
+            </a:pPr>
+            <a:r>
+              <a:rPr lang="en-US" sz="3200" b="1" dirty="0">
+                <a:solidFill>
+                  <a:srgbClr val="63B3ED"/>
+                </a:solidFill>
+                <a:latin typeface="Arial" pitchFamily="34" charset="0"/>
+                <a:ea typeface="Arial" pitchFamily="34" charset="-122"/>
+                <a:cs typeface="Arial" pitchFamily="34" charset="-120"/>
+              </a:rPr>
+              <a:t>Your Roadmap to Freedom</a:t>
+            </a:r>
+            <a:endParaRPr lang="en-US" sz="3200" dirty="0"/>
+          </a:p>
+        </p:txBody>
+      </p:sp>
+      <p:sp>
+        <p:nvSpPr>
+          <p:cNvPr id="3" name="Text 1"/>
+          <p:cNvSpPr/>
+          <p:nvPr/>
+        </p:nvSpPr>
+        <p:spPr>
+          <a:xfrm>
+            <a:off x="253901" y="1257300"/>
+            <a:ext cx="1727299" cy="1450777"/>
+          </a:xfrm>
+          <a:prstGeom prst="roundRect">
+            <a:avLst>
+              <a:gd name="adj" fmla="val 7003"/>
+            </a:avLst>
+          </a:prstGeom>
+          <a:solidFill>
+            <a:srgbClr val="2D3748"/>
+          </a:solidFill>
+          <a:ln/>
+          <a:effectLst>
+            <a:outerShdw sx="100000" sy="100000" kx="0" ky="0" algn="bl" rotWithShape="0" blurRad="76200" dist="50800" dir="5400000">
+              <a:srgbClr val="000000">
+                <a:alpha val="30000"/>
+              </a:srgbClr>
+            </a:outerShdw>
+          </a:effectLst>
+        </p:spPr>
+        <p:txBody>
+          <a:bodyPr wrap="square" rtlCol="0" anchor="ctr"/>
+          <a:lstStyle/>
+          <a:p>
+            <a:pPr indent="0" marL="0">
+              <a:buNone/>
+            </a:pPr>
+            <a:endParaRPr lang="en-US" dirty="0"/>
+          </a:p>
+        </p:txBody>
+      </p:sp>
+      <p:sp>
+        <p:nvSpPr>
+          <p:cNvPr id="4" name="Text 2"/>
+          <p:cNvSpPr/>
+          <p:nvPr/>
+        </p:nvSpPr>
+        <p:spPr>
+          <a:xfrm>
+            <a:off x="863501" y="1447800"/>
+            <a:ext cx="507950" cy="507950"/>
+          </a:xfrm>
+          <a:prstGeom prst="roundRect">
+            <a:avLst>
+              <a:gd name="adj" fmla="val 180018"/>
+            </a:avLst>
+          </a:prstGeom>
+          <a:solidFill>
+            <a:srgbClr val="1A202C"/>
+          </a:solidFill>
+          <a:ln/>
+        </p:spPr>
+        <p:txBody>
+          <a:bodyPr wrap="square" rtlCol="0" anchor="ctr"/>
+          <a:lstStyle/>
+          <a:p>
+            <a:pPr indent="0" marL="0">
+              <a:buNone/>
+            </a:pPr>
+            <a:endParaRPr lang="en-US" dirty="0"/>
+          </a:p>
+        </p:txBody>
+      </p:sp>
+      <p:sp>
+        <p:nvSpPr>
+          <p:cNvPr id="5" name="Text 3"/>
+          <p:cNvSpPr/>
+          <p:nvPr/>
+        </p:nvSpPr>
+        <p:spPr>
+          <a:xfrm>
+            <a:off x="1029962" y="1520726"/>
+            <a:ext cx="174879" cy="361950"/>
+          </a:xfrm>
+          <a:prstGeom prst="rect">
+            <a:avLst/>
+          </a:prstGeom>
+          <a:noFill/>
+          <a:ln/>
+        </p:spPr>
+        <p:txBody>
+          <a:bodyPr wrap="square" lIns="0" tIns="0" rIns="0" bIns="0" rtlCol="0" anchor="t"/>
+          <a:lstStyle/>
+          <a:p>
+            <a:pPr algn="ctr" indent="0" marL="0">
+              <a:buNone/>
+            </a:pPr>
+            <a:r>
+              <a:rPr lang="en-US" sz="2400" b="1" dirty="0">
+                <a:solidFill>
+                  <a:srgbClr val="F6AD55"/>
+                </a:solidFill>
+                <a:latin typeface="Arial" pitchFamily="34" charset="0"/>
+                <a:ea typeface="Arial" pitchFamily="34" charset="-122"/>
+                <a:cs typeface="Arial" pitchFamily="34" charset="-120"/>
+              </a:rPr>
+              <a:t>1</a:t>
+            </a:r>
+            <a:endParaRPr lang="en-US" sz="2400" dirty="0"/>
+          </a:p>
+        </p:txBody>
+      </p:sp>
+      <p:sp>
+        <p:nvSpPr>
+          <p:cNvPr id="6" name="Text 4"/>
+          <p:cNvSpPr/>
+          <p:nvPr/>
+        </p:nvSpPr>
+        <p:spPr>
+          <a:xfrm>
+            <a:off x="430938" y="2082701"/>
+            <a:ext cx="1373225" cy="219075"/>
+          </a:xfrm>
+          <a:prstGeom prst="rect">
+            <a:avLst/>
+          </a:prstGeom>
+          <a:noFill/>
+          <a:ln/>
+        </p:spPr>
+        <p:txBody>
+          <a:bodyPr wrap="square" lIns="0" tIns="0" rIns="0" bIns="0" rtlCol="0" anchor="t"/>
+          <a:lstStyle/>
+          <a:p>
+            <a:pPr algn="ctr" indent="0" marL="0">
+              <a:spcAft>
+                <a:spcPts val="500"/>
+              </a:spcAft>
+              <a:buNone/>
+            </a:pPr>
+            <a:r>
+              <a:rPr lang="en-US" sz="1400" b="1" dirty="0">
+                <a:solidFill>
+                  <a:srgbClr val="FFFFFF"/>
+                </a:solidFill>
+                <a:latin typeface="Arial" pitchFamily="34" charset="0"/>
+                <a:ea typeface="Arial" pitchFamily="34" charset="-122"/>
+                <a:cs typeface="Arial" pitchFamily="34" charset="-120"/>
+              </a:rPr>
+              <a:t>Qualify</a:t>
+            </a:r>
+            <a:endParaRPr lang="en-US" sz="1400" dirty="0"/>
+          </a:p>
+        </p:txBody>
+      </p:sp>
+      <p:sp>
+        <p:nvSpPr>
+          <p:cNvPr id="7" name="Text 5"/>
+          <p:cNvSpPr/>
+          <p:nvPr/>
+        </p:nvSpPr>
+        <p:spPr>
+          <a:xfrm>
+            <a:off x="430938" y="2365177"/>
+            <a:ext cx="1373225" cy="152400"/>
+          </a:xfrm>
+          <a:prstGeom prst="rect">
+            <a:avLst/>
+          </a:prstGeom>
+          <a:noFill/>
+          <a:ln/>
+        </p:spPr>
+        <p:txBody>
+          <a:bodyPr wrap="square" lIns="0" tIns="0" rIns="0" bIns="0" rtlCol="0" anchor="t"/>
+          <a:lstStyle/>
+          <a:p>
+            <a:pPr algn="ctr" indent="0" marL="0">
+              <a:buNone/>
+            </a:pPr>
+            <a:r>
+              <a:rPr lang="en-US" sz="1000" dirty="0">
+                <a:solidFill>
+                  <a:srgbClr val="CBD5E0"/>
+                </a:solidFill>
+                <a:latin typeface="Arial" pitchFamily="34" charset="0"/>
+                <a:ea typeface="Arial" pitchFamily="34" charset="-122"/>
+                <a:cs typeface="Arial" pitchFamily="34" charset="-120"/>
+              </a:rPr>
+              <a:t>Credit &amp; Usage Check</a:t>
+            </a:r>
+            <a:endParaRPr lang="en-US" sz="1000" dirty="0"/>
+          </a:p>
+        </p:txBody>
+      </p:sp>
+      <p:sp>
+        <p:nvSpPr>
+          <p:cNvPr id="8" name="Text 6"/>
+          <p:cNvSpPr/>
+          <p:nvPr/>
+        </p:nvSpPr>
+        <p:spPr>
+          <a:xfrm>
+            <a:off x="1981200" y="1257300"/>
+            <a:ext cx="1727150" cy="1450777"/>
+          </a:xfrm>
+          <a:prstGeom prst="roundRect">
+            <a:avLst>
+              <a:gd name="adj" fmla="val 7003"/>
+            </a:avLst>
+          </a:prstGeom>
+          <a:solidFill>
+            <a:srgbClr val="2D3748"/>
+          </a:solidFill>
+          <a:ln/>
+          <a:effectLst>
+            <a:outerShdw sx="100000" sy="100000" kx="0" ky="0" algn="bl" rotWithShape="0" blurRad="76200" dist="50800" dir="5400000">
+              <a:srgbClr val="000000">
+                <a:alpha val="30000"/>
+              </a:srgbClr>
+            </a:outerShdw>
+          </a:effectLst>
+        </p:spPr>
+        <p:txBody>
+          <a:bodyPr wrap="square" rtlCol="0" anchor="ctr"/>
+          <a:lstStyle/>
+          <a:p>
+            <a:pPr indent="0" marL="0">
+              <a:buNone/>
+            </a:pPr>
+            <a:endParaRPr lang="en-US" dirty="0"/>
+          </a:p>
+        </p:txBody>
+      </p:sp>
+      <p:sp>
+        <p:nvSpPr>
+          <p:cNvPr id="9" name="Text 7"/>
+          <p:cNvSpPr/>
+          <p:nvPr/>
+        </p:nvSpPr>
+        <p:spPr>
+          <a:xfrm>
+            <a:off x="2590800" y="1447800"/>
+            <a:ext cx="507950" cy="507950"/>
+          </a:xfrm>
+          <a:prstGeom prst="roundRect">
+            <a:avLst>
+              <a:gd name="adj" fmla="val 180018"/>
+            </a:avLst>
+          </a:prstGeom>
+          <a:solidFill>
+            <a:srgbClr val="1A202C"/>
+          </a:solidFill>
+          <a:ln/>
+        </p:spPr>
+        <p:txBody>
+          <a:bodyPr wrap="square" rtlCol="0" anchor="ctr"/>
+          <a:lstStyle/>
+          <a:p>
+            <a:pPr indent="0" marL="0">
+              <a:buNone/>
+            </a:pPr>
+            <a:endParaRPr lang="en-US" dirty="0"/>
+          </a:p>
+        </p:txBody>
+      </p:sp>
+      <p:sp>
+        <p:nvSpPr>
+          <p:cNvPr id="10" name="Text 8"/>
+          <p:cNvSpPr/>
+          <p:nvPr/>
+        </p:nvSpPr>
+        <p:spPr>
+          <a:xfrm>
+            <a:off x="2757261" y="1520726"/>
+            <a:ext cx="174879" cy="361950"/>
+          </a:xfrm>
+          <a:prstGeom prst="rect">
+            <a:avLst/>
+          </a:prstGeom>
+          <a:noFill/>
+          <a:ln/>
+        </p:spPr>
+        <p:txBody>
+          <a:bodyPr wrap="square" lIns="0" tIns="0" rIns="0" bIns="0" rtlCol="0" anchor="t"/>
+          <a:lstStyle/>
+          <a:p>
+            <a:pPr algn="ctr" indent="0" marL="0">
+              <a:buNone/>
+            </a:pPr>
+            <a:r>
+              <a:rPr lang="en-US" sz="2400" b="1" dirty="0">
+                <a:solidFill>
+                  <a:srgbClr val="F6AD55"/>
+                </a:solidFill>
+                <a:latin typeface="Arial" pitchFamily="34" charset="0"/>
+                <a:ea typeface="Arial" pitchFamily="34" charset="-122"/>
+                <a:cs typeface="Arial" pitchFamily="34" charset="-120"/>
+              </a:rPr>
+              <a:t>2</a:t>
+            </a:r>
+            <a:endParaRPr lang="en-US" sz="2400" dirty="0"/>
+          </a:p>
+        </p:txBody>
+      </p:sp>
+      <p:sp>
+        <p:nvSpPr>
+          <p:cNvPr id="11" name="Text 9"/>
+          <p:cNvSpPr/>
+          <p:nvPr/>
+        </p:nvSpPr>
+        <p:spPr>
+          <a:xfrm>
+            <a:off x="2158238" y="2082701"/>
+            <a:ext cx="1373073" cy="219075"/>
+          </a:xfrm>
+          <a:prstGeom prst="rect">
+            <a:avLst/>
+          </a:prstGeom>
+          <a:noFill/>
+          <a:ln/>
+        </p:spPr>
+        <p:txBody>
+          <a:bodyPr wrap="square" lIns="0" tIns="0" rIns="0" bIns="0" rtlCol="0" anchor="t"/>
+          <a:lstStyle/>
+          <a:p>
+            <a:pPr algn="ctr" indent="0" marL="0">
+              <a:spcAft>
+                <a:spcPts val="500"/>
+              </a:spcAft>
+              <a:buNone/>
+            </a:pPr>
+            <a:r>
+              <a:rPr lang="en-US" sz="1400" b="1" dirty="0">
+                <a:solidFill>
+                  <a:srgbClr val="FFFFFF"/>
+                </a:solidFill>
+                <a:latin typeface="Arial" pitchFamily="34" charset="0"/>
+                <a:ea typeface="Arial" pitchFamily="34" charset="-122"/>
+                <a:cs typeface="Arial" pitchFamily="34" charset="-120"/>
+              </a:rPr>
+              <a:t>Site Survey</a:t>
+            </a:r>
+            <a:endParaRPr lang="en-US" sz="1400" dirty="0"/>
+          </a:p>
+        </p:txBody>
+      </p:sp>
+      <p:sp>
+        <p:nvSpPr>
+          <p:cNvPr id="12" name="Text 10"/>
+          <p:cNvSpPr/>
+          <p:nvPr/>
+        </p:nvSpPr>
+        <p:spPr>
+          <a:xfrm>
+            <a:off x="2158238" y="2365177"/>
+            <a:ext cx="1373073" cy="152400"/>
+          </a:xfrm>
+          <a:prstGeom prst="rect">
+            <a:avLst/>
+          </a:prstGeom>
+          <a:noFill/>
+          <a:ln/>
+        </p:spPr>
+        <p:txBody>
+          <a:bodyPr wrap="square" lIns="0" tIns="0" rIns="0" bIns="0" rtlCol="0" anchor="t"/>
+          <a:lstStyle/>
+          <a:p>
+            <a:pPr algn="ctr" indent="0" marL="0">
+              <a:buNone/>
+            </a:pPr>
+            <a:r>
+              <a:rPr lang="en-US" sz="1000" dirty="0">
+                <a:solidFill>
+                  <a:srgbClr val="CBD5E0"/>
+                </a:solidFill>
+                <a:latin typeface="Arial" pitchFamily="34" charset="0"/>
+                <a:ea typeface="Arial" pitchFamily="34" charset="-122"/>
+                <a:cs typeface="Arial" pitchFamily="34" charset="-120"/>
+              </a:rPr>
+              <a:t>Roof Measurements</a:t>
+            </a:r>
+            <a:endParaRPr lang="en-US" sz="1000" dirty="0"/>
+          </a:p>
+        </p:txBody>
+      </p:sp>
+      <p:sp>
+        <p:nvSpPr>
+          <p:cNvPr id="13" name="Text 11"/>
+          <p:cNvSpPr/>
+          <p:nvPr/>
+        </p:nvSpPr>
+        <p:spPr>
+          <a:xfrm>
+            <a:off x="3708350" y="1257300"/>
+            <a:ext cx="1727299" cy="1450777"/>
+          </a:xfrm>
+          <a:prstGeom prst="roundRect">
+            <a:avLst>
+              <a:gd name="adj" fmla="val 7003"/>
+            </a:avLst>
+          </a:prstGeom>
+          <a:solidFill>
+            <a:srgbClr val="2D3748"/>
+          </a:solidFill>
+          <a:ln/>
+          <a:effectLst>
+            <a:outerShdw sx="100000" sy="100000" kx="0" ky="0" algn="bl" rotWithShape="0" blurRad="76200" dist="50800" dir="5400000">
+              <a:srgbClr val="000000">
+                <a:alpha val="30000"/>
+              </a:srgbClr>
+            </a:outerShdw>
+          </a:effectLst>
+        </p:spPr>
+        <p:txBody>
+          <a:bodyPr wrap="square" rtlCol="0" anchor="ctr"/>
+          <a:lstStyle/>
+          <a:p>
+            <a:pPr indent="0" marL="0">
+              <a:buNone/>
+            </a:pPr>
+            <a:endParaRPr lang="en-US" dirty="0"/>
+          </a:p>
+        </p:txBody>
+      </p:sp>
+      <p:sp>
+        <p:nvSpPr>
+          <p:cNvPr id="14" name="Text 12"/>
+          <p:cNvSpPr/>
+          <p:nvPr/>
+        </p:nvSpPr>
+        <p:spPr>
+          <a:xfrm>
+            <a:off x="4317950" y="1447800"/>
+            <a:ext cx="507950" cy="507950"/>
+          </a:xfrm>
+          <a:prstGeom prst="roundRect">
+            <a:avLst>
+              <a:gd name="adj" fmla="val 180018"/>
+            </a:avLst>
+          </a:prstGeom>
+          <a:solidFill>
+            <a:srgbClr val="1A202C"/>
+          </a:solidFill>
+          <a:ln/>
+        </p:spPr>
+        <p:txBody>
+          <a:bodyPr wrap="square" rtlCol="0" anchor="ctr"/>
+          <a:lstStyle/>
+          <a:p>
+            <a:pPr indent="0" marL="0">
+              <a:buNone/>
+            </a:pPr>
+            <a:endParaRPr lang="en-US" dirty="0"/>
+          </a:p>
+        </p:txBody>
+      </p:sp>
+      <p:sp>
+        <p:nvSpPr>
+          <p:cNvPr id="15" name="Text 13"/>
+          <p:cNvSpPr/>
+          <p:nvPr/>
+        </p:nvSpPr>
+        <p:spPr>
+          <a:xfrm>
+            <a:off x="4484412" y="1520726"/>
+            <a:ext cx="174879" cy="361950"/>
+          </a:xfrm>
+          <a:prstGeom prst="rect">
+            <a:avLst/>
+          </a:prstGeom>
+          <a:noFill/>
+          <a:ln/>
+        </p:spPr>
+        <p:txBody>
+          <a:bodyPr wrap="square" lIns="0" tIns="0" rIns="0" bIns="0" rtlCol="0" anchor="t"/>
+          <a:lstStyle/>
+          <a:p>
+            <a:pPr algn="ctr" indent="0" marL="0">
+              <a:buNone/>
+            </a:pPr>
+            <a:r>
+              <a:rPr lang="en-US" sz="2400" b="1" dirty="0">
+                <a:solidFill>
+                  <a:srgbClr val="F6AD55"/>
+                </a:solidFill>
+                <a:latin typeface="Arial" pitchFamily="34" charset="0"/>
+                <a:ea typeface="Arial" pitchFamily="34" charset="-122"/>
+                <a:cs typeface="Arial" pitchFamily="34" charset="-120"/>
+              </a:rPr>
+              <a:t>3</a:t>
+            </a:r>
+            <a:endParaRPr lang="en-US" sz="2400" dirty="0"/>
+          </a:p>
+        </p:txBody>
+      </p:sp>
+      <p:sp>
+        <p:nvSpPr>
+          <p:cNvPr id="16" name="Text 14"/>
+          <p:cNvSpPr/>
+          <p:nvPr/>
+        </p:nvSpPr>
+        <p:spPr>
+          <a:xfrm>
+            <a:off x="3885387" y="2082701"/>
+            <a:ext cx="1373225" cy="219075"/>
+          </a:xfrm>
+          <a:prstGeom prst="rect">
+            <a:avLst/>
+          </a:prstGeom>
+          <a:noFill/>
+          <a:ln/>
+        </p:spPr>
+        <p:txBody>
+          <a:bodyPr wrap="square" lIns="0" tIns="0" rIns="0" bIns="0" rtlCol="0" anchor="t"/>
+          <a:lstStyle/>
+          <a:p>
+            <a:pPr algn="ctr" indent="0" marL="0">
+              <a:spcAft>
+                <a:spcPts val="500"/>
+              </a:spcAft>
+              <a:buNone/>
+            </a:pPr>
+            <a:r>
+              <a:rPr lang="en-US" sz="1400" b="1" dirty="0">
+                <a:solidFill>
+                  <a:srgbClr val="FFFFFF"/>
+                </a:solidFill>
+                <a:latin typeface="Arial" pitchFamily="34" charset="0"/>
+                <a:ea typeface="Arial" pitchFamily="34" charset="-122"/>
+                <a:cs typeface="Arial" pitchFamily="34" charset="-120"/>
+              </a:rPr>
+              <a:t>Permitting</a:t>
+            </a:r>
+            <a:endParaRPr lang="en-US" sz="1400" dirty="0"/>
+          </a:p>
+        </p:txBody>
+      </p:sp>
+      <p:sp>
+        <p:nvSpPr>
+          <p:cNvPr id="17" name="Text 15"/>
+          <p:cNvSpPr/>
+          <p:nvPr/>
+        </p:nvSpPr>
+        <p:spPr>
+          <a:xfrm>
+            <a:off x="3885387" y="2365177"/>
+            <a:ext cx="1373225" cy="152400"/>
+          </a:xfrm>
+          <a:prstGeom prst="rect">
+            <a:avLst/>
+          </a:prstGeom>
+          <a:noFill/>
+          <a:ln/>
+        </p:spPr>
+        <p:txBody>
+          <a:bodyPr wrap="square" lIns="0" tIns="0" rIns="0" bIns="0" rtlCol="0" anchor="t"/>
+          <a:lstStyle/>
+          <a:p>
+            <a:pPr algn="ctr" indent="0" marL="0">
+              <a:buNone/>
+            </a:pPr>
+            <a:r>
+              <a:rPr lang="en-US" sz="1000" dirty="0">
+                <a:solidFill>
+                  <a:srgbClr val="CBD5E0"/>
+                </a:solidFill>
+                <a:latin typeface="Arial" pitchFamily="34" charset="0"/>
+                <a:ea typeface="Arial" pitchFamily="34" charset="-122"/>
+                <a:cs typeface="Arial" pitchFamily="34" charset="-120"/>
+              </a:rPr>
+              <a:t>City Approval</a:t>
+            </a:r>
+            <a:endParaRPr lang="en-US" sz="1000" dirty="0"/>
+          </a:p>
+        </p:txBody>
+      </p:sp>
+      <p:sp>
+        <p:nvSpPr>
+          <p:cNvPr id="18" name="Text 16"/>
+          <p:cNvSpPr/>
+          <p:nvPr/>
+        </p:nvSpPr>
+        <p:spPr>
+          <a:xfrm>
+            <a:off x="5435650" y="1257300"/>
+            <a:ext cx="1727150" cy="1450777"/>
+          </a:xfrm>
+          <a:prstGeom prst="roundRect">
+            <a:avLst>
+              <a:gd name="adj" fmla="val 7003"/>
+            </a:avLst>
+          </a:prstGeom>
+          <a:solidFill>
+            <a:srgbClr val="2D3748"/>
+          </a:solidFill>
+          <a:ln/>
+          <a:effectLst>
+            <a:outerShdw sx="100000" sy="100000" kx="0" ky="0" algn="bl" rotWithShape="0" blurRad="76200" dist="50800" dir="5400000">
+              <a:srgbClr val="000000">
+                <a:alpha val="30000"/>
+              </a:srgbClr>
+            </a:outerShdw>
+          </a:effectLst>
+        </p:spPr>
+        <p:txBody>
+          <a:bodyPr wrap="square" rtlCol="0" anchor="ctr"/>
+          <a:lstStyle/>
+          <a:p>
+            <a:pPr indent="0" marL="0">
+              <a:buNone/>
+            </a:pPr>
+            <a:endParaRPr lang="en-US" dirty="0"/>
+          </a:p>
+        </p:txBody>
+      </p:sp>
+      <p:sp>
+        <p:nvSpPr>
+          <p:cNvPr id="19" name="Text 17"/>
+          <p:cNvSpPr/>
+          <p:nvPr/>
+        </p:nvSpPr>
+        <p:spPr>
+          <a:xfrm>
+            <a:off x="6045250" y="1447800"/>
+            <a:ext cx="507950" cy="507950"/>
+          </a:xfrm>
+          <a:prstGeom prst="roundRect">
+            <a:avLst>
+              <a:gd name="adj" fmla="val 180018"/>
+            </a:avLst>
+          </a:prstGeom>
+          <a:solidFill>
+            <a:srgbClr val="1A202C"/>
+          </a:solidFill>
+          <a:ln/>
+        </p:spPr>
+        <p:txBody>
+          <a:bodyPr wrap="square" rtlCol="0" anchor="ctr"/>
+          <a:lstStyle/>
+          <a:p>
+            <a:pPr indent="0" marL="0">
+              <a:buNone/>
+            </a:pPr>
+            <a:endParaRPr lang="en-US" dirty="0"/>
+          </a:p>
+        </p:txBody>
+      </p:sp>
+      <p:sp>
+        <p:nvSpPr>
+          <p:cNvPr id="20" name="Text 18"/>
+          <p:cNvSpPr/>
+          <p:nvPr/>
+        </p:nvSpPr>
+        <p:spPr>
+          <a:xfrm>
+            <a:off x="6211711" y="1520726"/>
+            <a:ext cx="174879" cy="361950"/>
+          </a:xfrm>
+          <a:prstGeom prst="rect">
+            <a:avLst/>
+          </a:prstGeom>
+          <a:noFill/>
+          <a:ln/>
+        </p:spPr>
+        <p:txBody>
+          <a:bodyPr wrap="square" lIns="0" tIns="0" rIns="0" bIns="0" rtlCol="0" anchor="t"/>
+          <a:lstStyle/>
+          <a:p>
+            <a:pPr algn="ctr" indent="0" marL="0">
+              <a:buNone/>
+            </a:pPr>
+            <a:r>
+              <a:rPr lang="en-US" sz="2400" b="1" dirty="0">
+                <a:solidFill>
+                  <a:srgbClr val="F6AD55"/>
+                </a:solidFill>
+                <a:latin typeface="Arial" pitchFamily="34" charset="0"/>
+                <a:ea typeface="Arial" pitchFamily="34" charset="-122"/>
+                <a:cs typeface="Arial" pitchFamily="34" charset="-120"/>
+              </a:rPr>
+              <a:t>4</a:t>
+            </a:r>
+            <a:endParaRPr lang="en-US" sz="2400" dirty="0"/>
+          </a:p>
+        </p:txBody>
+      </p:sp>
+      <p:sp>
+        <p:nvSpPr>
+          <p:cNvPr id="21" name="Text 19"/>
+          <p:cNvSpPr/>
+          <p:nvPr/>
+        </p:nvSpPr>
+        <p:spPr>
+          <a:xfrm>
+            <a:off x="5612688" y="2082701"/>
+            <a:ext cx="1373073" cy="219075"/>
+          </a:xfrm>
+          <a:prstGeom prst="rect">
+            <a:avLst/>
+          </a:prstGeom>
+          <a:noFill/>
+          <a:ln/>
+        </p:spPr>
+        <p:txBody>
+          <a:bodyPr wrap="square" lIns="0" tIns="0" rIns="0" bIns="0" rtlCol="0" anchor="t"/>
+          <a:lstStyle/>
+          <a:p>
+            <a:pPr algn="ctr" indent="0" marL="0">
+              <a:spcAft>
+                <a:spcPts val="500"/>
+              </a:spcAft>
+              <a:buNone/>
+            </a:pPr>
+            <a:r>
+              <a:rPr lang="en-US" sz="1400" b="1" dirty="0">
+                <a:solidFill>
+                  <a:srgbClr val="FFFFFF"/>
+                </a:solidFill>
+                <a:latin typeface="Arial" pitchFamily="34" charset="0"/>
+                <a:ea typeface="Arial" pitchFamily="34" charset="-122"/>
+                <a:cs typeface="Arial" pitchFamily="34" charset="-120"/>
+              </a:rPr>
+              <a:t>Install</a:t>
+            </a:r>
+            <a:endParaRPr lang="en-US" sz="1400" dirty="0"/>
+          </a:p>
+        </p:txBody>
+      </p:sp>
+      <p:sp>
+        <p:nvSpPr>
+          <p:cNvPr id="22" name="Text 20"/>
+          <p:cNvSpPr/>
+          <p:nvPr/>
+        </p:nvSpPr>
+        <p:spPr>
+          <a:xfrm>
+            <a:off x="5612688" y="2365177"/>
+            <a:ext cx="1373073" cy="152400"/>
+          </a:xfrm>
+          <a:prstGeom prst="rect">
+            <a:avLst/>
+          </a:prstGeom>
+          <a:noFill/>
+          <a:ln/>
+        </p:spPr>
+        <p:txBody>
+          <a:bodyPr wrap="square" lIns="0" tIns="0" rIns="0" bIns="0" rtlCol="0" anchor="t"/>
+          <a:lstStyle/>
+          <a:p>
+            <a:pPr algn="ctr" indent="0" marL="0">
+              <a:buNone/>
+            </a:pPr>
+            <a:r>
+              <a:rPr lang="en-US" sz="1000" dirty="0">
+                <a:solidFill>
+                  <a:srgbClr val="CBD5E0"/>
+                </a:solidFill>
+                <a:latin typeface="Arial" pitchFamily="34" charset="0"/>
+                <a:ea typeface="Arial" pitchFamily="34" charset="-122"/>
+                <a:cs typeface="Arial" pitchFamily="34" charset="-120"/>
+              </a:rPr>
+              <a:t>System Build</a:t>
+            </a:r>
+            <a:endParaRPr lang="en-US" sz="1000" dirty="0"/>
+          </a:p>
+        </p:txBody>
+      </p:sp>
+      <p:sp>
+        <p:nvSpPr>
+          <p:cNvPr id="23" name="Text 21"/>
+          <p:cNvSpPr/>
+          <p:nvPr/>
+        </p:nvSpPr>
+        <p:spPr>
+          <a:xfrm>
+            <a:off x="7162800" y="1257300"/>
+            <a:ext cx="1727299" cy="1450777"/>
+          </a:xfrm>
+          <a:prstGeom prst="roundRect">
+            <a:avLst>
+              <a:gd name="adj" fmla="val 7003"/>
+            </a:avLst>
+          </a:prstGeom>
+          <a:solidFill>
+            <a:srgbClr val="2D3748"/>
+          </a:solidFill>
+          <a:ln/>
+          <a:effectLst>
+            <a:outerShdw sx="100000" sy="100000" kx="0" ky="0" algn="bl" rotWithShape="0" blurRad="76200" dist="50800" dir="5400000">
+              <a:srgbClr val="000000">
+                <a:alpha val="30000"/>
+              </a:srgbClr>
+            </a:outerShdw>
+          </a:effectLst>
+        </p:spPr>
+        <p:txBody>
+          <a:bodyPr wrap="square" rtlCol="0" anchor="ctr"/>
+          <a:lstStyle/>
+          <a:p>
+            <a:pPr indent="0" marL="0">
+              <a:buNone/>
+            </a:pPr>
+            <a:endParaRPr lang="en-US" dirty="0"/>
+          </a:p>
+        </p:txBody>
+      </p:sp>
+      <p:sp>
+        <p:nvSpPr>
+          <p:cNvPr id="24" name="Text 22"/>
+          <p:cNvSpPr/>
+          <p:nvPr/>
+        </p:nvSpPr>
+        <p:spPr>
+          <a:xfrm>
+            <a:off x="7772400" y="1447800"/>
+            <a:ext cx="507950" cy="507950"/>
+          </a:xfrm>
+          <a:prstGeom prst="roundRect">
+            <a:avLst>
+              <a:gd name="adj" fmla="val 180018"/>
+            </a:avLst>
+          </a:prstGeom>
+          <a:solidFill>
+            <a:srgbClr val="1A202C"/>
+          </a:solidFill>
+          <a:ln/>
+        </p:spPr>
+        <p:txBody>
+          <a:bodyPr wrap="square" rtlCol="0" anchor="ctr"/>
+          <a:lstStyle/>
+          <a:p>
+            <a:pPr indent="0" marL="0">
+              <a:buNone/>
+            </a:pPr>
+            <a:endParaRPr lang="en-US" dirty="0"/>
+          </a:p>
+        </p:txBody>
+      </p:sp>
+      <p:sp>
+        <p:nvSpPr>
+          <p:cNvPr id="25" name="Text 23"/>
+          <p:cNvSpPr/>
+          <p:nvPr/>
+        </p:nvSpPr>
+        <p:spPr>
+          <a:xfrm>
+            <a:off x="7938861" y="1520726"/>
+            <a:ext cx="174879" cy="361950"/>
+          </a:xfrm>
+          <a:prstGeom prst="rect">
+            <a:avLst/>
+          </a:prstGeom>
+          <a:noFill/>
+          <a:ln/>
+        </p:spPr>
+        <p:txBody>
+          <a:bodyPr wrap="square" lIns="0" tIns="0" rIns="0" bIns="0" rtlCol="0" anchor="t"/>
+          <a:lstStyle/>
+          <a:p>
+            <a:pPr algn="ctr" indent="0" marL="0">
+              <a:buNone/>
+            </a:pPr>
+            <a:r>
+              <a:rPr lang="en-US" sz="2400" b="1" dirty="0">
+                <a:solidFill>
+                  <a:srgbClr val="F6AD55"/>
+                </a:solidFill>
+                <a:latin typeface="Arial" pitchFamily="34" charset="0"/>
+                <a:ea typeface="Arial" pitchFamily="34" charset="-122"/>
+                <a:cs typeface="Arial" pitchFamily="34" charset="-120"/>
+              </a:rPr>
+              <a:t>5</a:t>
+            </a:r>
+            <a:endParaRPr lang="en-US" sz="2400" dirty="0"/>
+          </a:p>
+        </p:txBody>
+      </p:sp>
+      <p:sp>
+        <p:nvSpPr>
+          <p:cNvPr id="26" name="Text 24"/>
+          <p:cNvSpPr/>
+          <p:nvPr/>
+        </p:nvSpPr>
+        <p:spPr>
+          <a:xfrm>
+            <a:off x="7339837" y="2082701"/>
+            <a:ext cx="1373225" cy="219075"/>
+          </a:xfrm>
+          <a:prstGeom prst="rect">
+            <a:avLst/>
+          </a:prstGeom>
+          <a:noFill/>
+          <a:ln/>
+        </p:spPr>
+        <p:txBody>
+          <a:bodyPr wrap="square" lIns="0" tIns="0" rIns="0" bIns="0" rtlCol="0" anchor="t"/>
+          <a:lstStyle/>
+          <a:p>
+            <a:pPr algn="ctr" indent="0" marL="0">
+              <a:spcAft>
+                <a:spcPts val="500"/>
+              </a:spcAft>
+              <a:buNone/>
+            </a:pPr>
+            <a:r>
+              <a:rPr lang="en-US" sz="1400" b="1" dirty="0">
+                <a:solidFill>
+                  <a:srgbClr val="FFFFFF"/>
+                </a:solidFill>
+                <a:latin typeface="Arial" pitchFamily="34" charset="0"/>
+                <a:ea typeface="Arial" pitchFamily="34" charset="-122"/>
+                <a:cs typeface="Arial" pitchFamily="34" charset="-120"/>
+              </a:rPr>
+              <a:t>Activation</a:t>
+            </a:r>
+            <a:endParaRPr lang="en-US" sz="1400" dirty="0"/>
+          </a:p>
+        </p:txBody>
+      </p:sp>
+      <p:sp>
+        <p:nvSpPr>
+          <p:cNvPr id="27" name="Text 25"/>
+          <p:cNvSpPr/>
+          <p:nvPr/>
+        </p:nvSpPr>
+        <p:spPr>
+          <a:xfrm>
+            <a:off x="7339837" y="2365177"/>
+            <a:ext cx="1373225" cy="152400"/>
+          </a:xfrm>
+          <a:prstGeom prst="rect">
+            <a:avLst/>
+          </a:prstGeom>
+          <a:noFill/>
+          <a:ln/>
+        </p:spPr>
+        <p:txBody>
+          <a:bodyPr wrap="square" lIns="0" tIns="0" rIns="0" bIns="0" rtlCol="0" anchor="t"/>
+          <a:lstStyle/>
+          <a:p>
+            <a:pPr algn="ctr" indent="0" marL="0">
+              <a:buNone/>
+            </a:pPr>
+            <a:r>
+              <a:rPr lang="en-US" sz="1000" dirty="0">
+                <a:solidFill>
+                  <a:srgbClr val="CBD5E0"/>
+                </a:solidFill>
+                <a:latin typeface="Arial" pitchFamily="34" charset="0"/>
+                <a:ea typeface="Arial" pitchFamily="34" charset="-122"/>
+                <a:cs typeface="Arial" pitchFamily="34" charset="-120"/>
+              </a:rPr>
+              <a:t>PTO &amp; Savings</a:t>
+            </a:r>
+            <a:endParaRPr lang="en-US" sz="1000" dirty="0"/>
+          </a:p>
+        </p:txBody>
+      </p:sp>
+    </p:spTree>
+  </p:cSld>
+  <p:clrMapOvr>
+    <a:masterClrMapping/>
+  </p:clrMapOvr>
+</p:sld>
+</file>
+
+<file path=ppt/slides/slide11.xml><?xml version="1.0" encoding="utf-8"?>
+<p:sld xmlns:a="http://schemas.openxmlformats.org/drawingml/2006/main" xmlns:r="http://schemas.openxmlformats.org/officeDocument/2006/relationships" xmlns:p="http://schemas.openxmlformats.org/presentationml/2006/main">
+  <p:cSld name="Slide 11">
+    <p:bg>
+      <p:bgPr>
+        <a:solidFill>
+          <a:srgbClr val="1A202C"/>
+        </a:solidFill>
+      </p:bgPr>
+    </p:bg>
+    <p:spTree>
+      <p:nvGrpSpPr>
+        <p:cNvPr id="1" name=""/>
+        <p:cNvGrpSpPr/>
+        <p:nvPr/>
+      </p:nvGrpSpPr>
+      <p:grpSpPr>
+        <a:xfrm>
+          <a:off x="0" y="0"/>
+          <a:ext cx="0" cy="0"/>
+          <a:chOff x="0" y="0"/>
+          <a:chExt cx="0" cy="0"/>
+        </a:xfrm>
+      </p:grpSpPr>
+      <p:sp>
+        <p:nvSpPr>
+          <p:cNvPr id="2" name="Text 0"/>
+          <p:cNvSpPr/>
+          <p:nvPr/>
+        </p:nvSpPr>
+        <p:spPr>
+          <a:xfrm>
+            <a:off x="1643063" y="1367582"/>
+            <a:ext cx="5975033" cy="552450"/>
+          </a:xfrm>
+          <a:prstGeom prst="rect">
+            <a:avLst/>
+          </a:prstGeom>
+          <a:noFill/>
+          <a:ln/>
+        </p:spPr>
+        <p:txBody>
+          <a:bodyPr wrap="square" lIns="0" tIns="0" rIns="0" bIns="0" rtlCol="0" anchor="t"/>
+          <a:lstStyle/>
+          <a:p>
+            <a:pPr algn="l" indent="0" marL="0">
+              <a:spcBef>
+                <a:spcPts val="2412"/>
+              </a:spcBef>
+              <a:spcAft>
+                <a:spcPts val="3000"/>
+              </a:spcAft>
+              <a:buNone/>
+            </a:pPr>
+            <a:r>
+              <a:rPr lang="en-US" sz="3600" b="1" dirty="0">
+                <a:solidFill>
+                  <a:srgbClr val="68D391"/>
+                </a:solidFill>
+                <a:latin typeface="Arial" pitchFamily="34" charset="0"/>
+                <a:ea typeface="Arial" pitchFamily="34" charset="-122"/>
+                <a:cs typeface="Arial" pitchFamily="34" charset="-120"/>
+              </a:rPr>
+              <a:t>Ready to own your power?</a:t>
+            </a:r>
+            <a:endParaRPr lang="en-US" sz="3600" dirty="0"/>
+          </a:p>
+        </p:txBody>
+      </p:sp>
+      <p:sp>
+        <p:nvSpPr>
+          <p:cNvPr id="3" name="Text 1"/>
+          <p:cNvSpPr/>
+          <p:nvPr/>
+        </p:nvSpPr>
+        <p:spPr>
+          <a:xfrm>
+            <a:off x="2662904" y="2605832"/>
+            <a:ext cx="3818192" cy="352425"/>
+          </a:xfrm>
+          <a:prstGeom prst="rect">
+            <a:avLst/>
+          </a:prstGeom>
+          <a:noFill/>
+          <a:ln/>
+        </p:spPr>
+        <p:txBody>
+          <a:bodyPr wrap="square" lIns="0" tIns="0" rIns="0" bIns="0" rtlCol="0" anchor="t"/>
+          <a:lstStyle/>
+          <a:p>
+            <a:pPr algn="ctr" indent="0" marL="0">
+              <a:spcBef>
+                <a:spcPts val="2400"/>
+              </a:spcBef>
+              <a:spcAft>
+                <a:spcPts val="3000"/>
               </a:spcAft>
               <a:buNone/>
             </a:pPr>
             <a:r>
               <a:rPr lang="en-US" sz="2400" dirty="0">
                 <a:solidFill>
-                  <a:srgbClr val="E2E8F0"/>
-                </a:solidFill>
-                <a:latin typeface="Arial" pitchFamily="34" charset="0"/>
-                <a:ea typeface="Arial" pitchFamily="34" charset="-122"/>
-                <a:cs typeface="Arial" pitchFamily="34" charset="-120"/>
-              </a:rPr>
-              <a:t>Homeowner Education Program</a:t>
+                  <a:srgbClr val="CBD5E0"/>
+                </a:solidFill>
+                <a:latin typeface="Arial" pitchFamily="34" charset="0"/>
+                <a:ea typeface="Arial" pitchFamily="34" charset="-122"/>
+                <a:cs typeface="Arial" pitchFamily="34" charset="-120"/>
+              </a:rPr>
+              <a:t>Stop Renting. Start Owning.</a:t>
+            </a:r>
+            <a:endParaRPr lang="en-US" sz="2400" dirty="0"/>
+          </a:p>
+        </p:txBody>
+      </p:sp>
+      <p:sp>
+        <p:nvSpPr>
+          <p:cNvPr id="4" name="Text 2"/>
+          <p:cNvSpPr/>
+          <p:nvPr/>
+        </p:nvSpPr>
+        <p:spPr>
+          <a:xfrm>
+            <a:off x="2679799" y="3339257"/>
+            <a:ext cx="3784402" cy="742950"/>
+          </a:xfrm>
+          <a:prstGeom prst="roundRect">
+            <a:avLst>
+              <a:gd name="adj" fmla="val 85470"/>
+            </a:avLst>
+          </a:prstGeom>
+          <a:solidFill>
+            <a:srgbClr val="3182CE"/>
+          </a:solidFill>
+          <a:ln/>
+          <a:effectLst>
+            <a:outerShdw sx="100000" sy="100000" kx="0" ky="0" algn="bl" rotWithShape="0" blurRad="152400" dist="50800" dir="5400000">
+              <a:srgbClr val="3182ce">
+                <a:alpha val="50000"/>
+              </a:srgbClr>
+            </a:outerShdw>
+          </a:effectLst>
+        </p:spPr>
+        <p:txBody>
+          <a:bodyPr wrap="square" rtlCol="0" anchor="ctr"/>
+          <a:lstStyle/>
+          <a:p>
+            <a:pPr indent="0" marL="0">
+              <a:buNone/>
+            </a:pPr>
+            <a:endParaRPr lang="en-US" dirty="0"/>
+          </a:p>
+        </p:txBody>
+      </p:sp>
+      <p:sp>
+        <p:nvSpPr>
+          <p:cNvPr id="5" name="Text 3"/>
+          <p:cNvSpPr/>
+          <p:nvPr/>
+        </p:nvSpPr>
+        <p:spPr>
+          <a:xfrm>
+            <a:off x="3289554" y="3529757"/>
+            <a:ext cx="2564892" cy="361950"/>
+          </a:xfrm>
+          <a:prstGeom prst="rect">
+            <a:avLst/>
+          </a:prstGeom>
+          <a:noFill/>
+          <a:ln/>
+        </p:spPr>
+        <p:txBody>
+          <a:bodyPr wrap="square" lIns="0" tIns="0" rIns="0" bIns="0" rtlCol="0" anchor="t"/>
+          <a:lstStyle/>
+          <a:p>
+            <a:pPr algn="ctr" indent="0" marL="0">
+              <a:buNone/>
+            </a:pPr>
+            <a:r>
+              <a:rPr lang="en-US" sz="2400" b="1" dirty="0">
+                <a:solidFill>
+                  <a:srgbClr val="FFFFFF"/>
+                </a:solidFill>
+                <a:latin typeface="Arial" pitchFamily="34" charset="0"/>
+                <a:ea typeface="Arial" pitchFamily="34" charset="-122"/>
+                <a:cs typeface="Arial" pitchFamily="34" charset="-120"/>
+              </a:rPr>
+              <a:t>See if you qualify</a:t>
             </a:r>
             <a:endParaRPr lang="en-US" sz="2400" dirty="0"/>
           </a:p>
@@ -1391,8 +3180,8 @@
         </p:nvSpPr>
         <p:spPr>
           <a:xfrm>
-            <a:off x="507950" y="950119"/>
-            <a:ext cx="3316325" cy="975420"/>
+            <a:off x="507950" y="804565"/>
+            <a:ext cx="4145331" cy="495300"/>
           </a:xfrm>
           <a:prstGeom prst="rect">
             <a:avLst/>
@@ -1405,9 +3194,6 @@
           <a:lstStyle/>
           <a:p>
             <a:pPr algn="l" indent="0" marL="0">
-              <a:lnSpc>
-                <a:spcPts val="3840"/>
-              </a:lnSpc>
               <a:spcBef>
                 <a:spcPts val="2144"/>
               </a:spcBef>
@@ -1419,13 +3205,13 @@
             <a:r>
               <a:rPr lang="en-US" sz="3200" b="1" dirty="0">
                 <a:solidFill>
-                  <a:srgbClr val="FC8181"/>
-                </a:solidFill>
-                <a:latin typeface="Arial" pitchFamily="34" charset="0"/>
-                <a:ea typeface="Arial" pitchFamily="34" charset="-122"/>
-                <a:cs typeface="Arial" pitchFamily="34" charset="-120"/>
-              </a:rPr>
-              <a:t>The Cost of Doing Nothing</a:t>
+                  <a:srgbClr val="63B3ED"/>
+                </a:solidFill>
+                <a:latin typeface="Arial" pitchFamily="34" charset="0"/>
+                <a:ea typeface="Arial" pitchFamily="34" charset="-122"/>
+                <a:cs typeface="Arial" pitchFamily="34" charset="-120"/>
+              </a:rPr>
+              <a:t>Why We Are Here</a:t>
             </a:r>
             <a:endParaRPr lang="en-US" sz="3200" dirty="0"/>
           </a:p>
@@ -1439,8 +3225,8 @@
         </p:nvSpPr>
         <p:spPr>
           <a:xfrm>
-            <a:off x="507950" y="2408039"/>
-            <a:ext cx="3316325" cy="685800"/>
+            <a:off x="507950" y="1807666"/>
+            <a:ext cx="4145331" cy="1228874"/>
           </a:xfrm>
           <a:prstGeom prst="rect">
             <a:avLst/>
@@ -1454,18 +3240,18 @@
           <a:p>
             <a:pPr algn="l" indent="0" marL="0">
               <a:lnSpc>
-                <a:spcPts val="2700"/>
+                <a:spcPts val="3200"/>
               </a:lnSpc>
               <a:spcBef>
-                <a:spcPts val="1800"/>
+                <a:spcPts val="2000"/>
               </a:spcBef>
               <a:spcAft>
-                <a:spcPts val="1800"/>
-              </a:spcAft>
-              <a:buNone/>
-            </a:pPr>
-            <a:r>
-              <a:rPr lang="en-US" sz="1800" dirty="0">
+                <a:spcPts val="2000"/>
+              </a:spcAft>
+              <a:buNone/>
+            </a:pPr>
+            <a:r>
+              <a:rPr lang="en-US" sz="2000" dirty="0">
                 <a:solidFill>
                   <a:srgbClr val="CBD5E0"/>
                 </a:solidFill>
@@ -1473,47 +3259,45 @@
                 <a:ea typeface="Arial" pitchFamily="34" charset="-122"/>
                 <a:cs typeface="Arial" pitchFamily="34" charset="-120"/>
               </a:rPr>
-              <a:t>Utility rates are historically rising at 4-6% per year.</a:t>
-            </a:r>
-            <a:endParaRPr lang="en-US" sz="1800" dirty="0"/>
-          </a:p>
-        </p:txBody>
-      </p:sp>
-      <p:sp>
-        <p:nvSpPr>
-          <p:cNvPr id="4" name="Text 2"/>
-          <p:cNvSpPr/>
-          <p:nvPr/>
-        </p:nvSpPr>
-        <p:spPr>
-          <a:xfrm>
-            <a:off x="507950" y="3551039"/>
-            <a:ext cx="3316325" cy="685800"/>
-          </a:xfrm>
-          <a:prstGeom prst="rect">
-            <a:avLst/>
-          </a:prstGeom>
-          <a:noFill/>
-          <a:ln/>
-        </p:spPr>
-        <p:txBody>
-          <a:bodyPr wrap="square" lIns="0" tIns="0" rIns="0" bIns="0" rtlCol="0" anchor="t"/>
-          <a:lstStyle/>
-          <a:p>
+              <a:t>Our mission is simple: To help homeowners transition from </a:t>
+            </a:r>
             <a:pPr algn="l" indent="0" marL="0">
               <a:lnSpc>
-                <a:spcPts val="2700"/>
+                <a:spcPts val="3200"/>
               </a:lnSpc>
               <a:spcBef>
-                <a:spcPts val="1800"/>
+                <a:spcPts val="2000"/>
               </a:spcBef>
               <a:spcAft>
-                <a:spcPts val="1800"/>
-              </a:spcAft>
-              <a:buNone/>
-            </a:pPr>
-            <a:r>
-              <a:rPr lang="en-US" sz="1800" dirty="0">
+                <a:spcPts val="2000"/>
+              </a:spcAft>
+              <a:buNone/>
+            </a:pPr>
+            <a:r>
+              <a:rPr lang="en-US" sz="2000" b="1" dirty="0">
+                <a:solidFill>
+                  <a:srgbClr val="F6AD55"/>
+                </a:solidFill>
+                <a:latin typeface="Arial" pitchFamily="34" charset="0"/>
+                <a:ea typeface="Arial" pitchFamily="34" charset="-122"/>
+                <a:cs typeface="Arial" pitchFamily="34" charset="-120"/>
+              </a:rPr>
+              <a:t>renting</a:t>
+            </a:r>
+            <a:pPr algn="l" indent="0" marL="0">
+              <a:lnSpc>
+                <a:spcPts val="3200"/>
+              </a:lnSpc>
+              <a:spcBef>
+                <a:spcPts val="2000"/>
+              </a:spcBef>
+              <a:spcAft>
+                <a:spcPts val="2000"/>
+              </a:spcAft>
+              <a:buNone/>
+            </a:pPr>
+            <a:r>
+              <a:rPr lang="en-US" sz="2000" dirty="0">
                 <a:solidFill>
                   <a:srgbClr val="CBD5E0"/>
                 </a:solidFill>
@@ -1521,9 +3305,103 @@
                 <a:ea typeface="Arial" pitchFamily="34" charset="-122"/>
                 <a:cs typeface="Arial" pitchFamily="34" charset="-120"/>
               </a:rPr>
-              <a:t>Doing nothing isn't free. It's the most expensive option.</a:t>
-            </a:r>
-            <a:endParaRPr lang="en-US" sz="1800" dirty="0"/>
+              <a:t> their power to </a:t>
+            </a:r>
+            <a:pPr algn="l" indent="0" marL="0">
+              <a:lnSpc>
+                <a:spcPts val="3200"/>
+              </a:lnSpc>
+              <a:spcBef>
+                <a:spcPts val="2000"/>
+              </a:spcBef>
+              <a:spcAft>
+                <a:spcPts val="2000"/>
+              </a:spcAft>
+              <a:buNone/>
+            </a:pPr>
+            <a:r>
+              <a:rPr lang="en-US" sz="2000" b="1" dirty="0">
+                <a:solidFill>
+                  <a:srgbClr val="F6AD55"/>
+                </a:solidFill>
+                <a:latin typeface="Arial" pitchFamily="34" charset="0"/>
+                <a:ea typeface="Arial" pitchFamily="34" charset="-122"/>
+                <a:cs typeface="Arial" pitchFamily="34" charset="-120"/>
+              </a:rPr>
+              <a:t>owning</a:t>
+            </a:r>
+            <a:pPr algn="l" indent="0" marL="0">
+              <a:lnSpc>
+                <a:spcPts val="3200"/>
+              </a:lnSpc>
+              <a:spcBef>
+                <a:spcPts val="2000"/>
+              </a:spcBef>
+              <a:spcAft>
+                <a:spcPts val="2000"/>
+              </a:spcAft>
+              <a:buNone/>
+            </a:pPr>
+            <a:r>
+              <a:rPr lang="en-US" sz="2000" dirty="0">
+                <a:solidFill>
+                  <a:srgbClr val="CBD5E0"/>
+                </a:solidFill>
+                <a:latin typeface="Arial" pitchFamily="34" charset="0"/>
+                <a:ea typeface="Arial" pitchFamily="34" charset="-122"/>
+                <a:cs typeface="Arial" pitchFamily="34" charset="-120"/>
+              </a:rPr>
+              <a:t> it.</a:t>
+            </a:r>
+            <a:endParaRPr lang="en-US" sz="2000" dirty="0"/>
+          </a:p>
+        </p:txBody>
+      </p:sp>
+      <p:sp>
+        <p:nvSpPr>
+          <p:cNvPr id="4" name="Text 2"/>
+          <p:cNvSpPr/>
+          <p:nvPr/>
+        </p:nvSpPr>
+        <p:spPr>
+          <a:xfrm>
+            <a:off x="507950" y="3544342"/>
+            <a:ext cx="4145331" cy="812899"/>
+          </a:xfrm>
+          <a:prstGeom prst="rect">
+            <a:avLst/>
+          </a:prstGeom>
+          <a:noFill/>
+          <a:ln/>
+        </p:spPr>
+        <p:txBody>
+          <a:bodyPr wrap="square" lIns="0" tIns="0" rIns="0" bIns="0" rtlCol="0" anchor="t"/>
+          <a:lstStyle/>
+          <a:p>
+            <a:pPr algn="l" indent="0" marL="0">
+              <a:lnSpc>
+                <a:spcPts val="3200"/>
+              </a:lnSpc>
+              <a:spcBef>
+                <a:spcPts val="2000"/>
+              </a:spcBef>
+              <a:spcAft>
+                <a:spcPts val="2000"/>
+              </a:spcAft>
+              <a:buNone/>
+            </a:pPr>
+            <a:r>
+              <a:rPr lang="en-US" sz="2000" dirty="0">
+                <a:solidFill>
+                  <a:srgbClr val="CBD5E0"/>
+                </a:solidFill>
+                <a:latin typeface="Arial" pitchFamily="34" charset="0"/>
+                <a:ea typeface="Arial" pitchFamily="34" charset="-122"/>
+                <a:cs typeface="Arial" pitchFamily="34" charset="-120"/>
+              </a:rPr>
+              <a:t>Every eco-friendly decision starts with a financially smart one.</a:t>
+            </a:r>
+            <a:endParaRPr lang="en-US" sz="2000" dirty="0"/>
           </a:p>
         </p:txBody>
       </p:sp>
@@ -1535,8 +3413,8 @@
         </p:nvSpPr>
         <p:spPr>
           <a:xfrm>
-            <a:off x="4267200" y="0"/>
-            <a:ext cx="4876800" cy="5143500"/>
+            <a:off x="5079950" y="0"/>
+            <a:ext cx="4064050" cy="5143500"/>
           </a:xfrm>
           <a:prstGeom prst="rect">
             <a:avLst/>
@@ -1557,30 +3435,54 @@
           </a:p>
         </p:txBody>
       </p:sp>
-      <p:pic>
-        <p:nvPicPr>
-          <p:cNvPr id="6" name="Image 0" descr="C:\Users\12132\Desktop\Antigravity Solar Sales Trainer Agent\solar-trainer\presentation_gen\inflation_curve.png">    </p:cNvPr>
-          <p:cNvPicPr>
-            <a:picLocks noChangeAspect="1"/>
-          </p:cNvPicPr>
-          <p:nvPr/>
-        </p:nvPicPr>
-        <p:blipFill>
-          <a:blip r:embed="rId1"/>
-          <a:stretch>
-            <a:fillRect/>
-          </a:stretch>
-        </p:blipFill>
-        <p:spPr>
-          <a:xfrm>
-            <a:off x="4510980" y="666750"/>
-            <a:ext cx="4389090" cy="3810000"/>
-          </a:xfrm>
-          <a:prstGeom prst="rect">
-            <a:avLst/>
-          </a:prstGeom>
-        </p:spPr>
-      </p:pic>
+      <p:sp>
+        <p:nvSpPr>
+          <p:cNvPr id="6" name="Text 4"/>
+          <p:cNvSpPr/>
+          <p:nvPr/>
+        </p:nvSpPr>
+        <p:spPr>
+          <a:xfrm>
+            <a:off x="6935688" y="2368451"/>
+            <a:ext cx="359474" cy="406450"/>
+          </a:xfrm>
+          <a:prstGeom prst="rect">
+            <a:avLst/>
+          </a:prstGeom>
+          <a:noFill/>
+          <a:ln/>
+        </p:spPr>
+        <p:txBody>
+          <a:bodyPr wrap="square" lIns="0" tIns="0" rIns="0" bIns="0" rtlCol="0" anchor="t"/>
+          <a:lstStyle/>
+          <a:p>
+            <a:pPr algn="l" indent="0" marL="0">
+              <a:lnSpc>
+                <a:spcPts val="3200"/>
+              </a:lnSpc>
+              <a:spcBef>
+                <a:spcPts val="2000"/>
+              </a:spcBef>
+              <a:spcAft>
+                <a:spcPts val="2000"/>
+              </a:spcAft>
+              <a:buNone/>
+            </a:pPr>
+            <a:r>
+              <a:rPr lang="en-US" sz="2000" dirty="0">
+                <a:solidFill>
+                  <a:srgbClr val="CBD5E0"/>
+                </a:solidFill>
+                <a:latin typeface="Arial" pitchFamily="34" charset="0"/>
+                <a:ea typeface="Arial" pitchFamily="34" charset="-122"/>
+                <a:cs typeface="Arial" pitchFamily="34" charset="-120"/>
+              </a:rPr>
+              <a:t>☀️</a:t>
+            </a:r>
+            <a:endParaRPr lang="en-US" sz="2000" dirty="0"/>
+          </a:p>
+        </p:txBody>
+      </p:sp>
     </p:spTree>
   </p:cSld>
   <p:clrMapOvr>
@@ -1621,25 +3523,40 @@
         </p:nvSpPr>
         <p:spPr>
           <a:xfrm>
-            <a:off x="0" y="0"/>
-            <a:ext cx="9144000" cy="771525"/>
-          </a:xfrm>
-          <a:prstGeom prst="rect">
-            <a:avLst/>
-          </a:prstGeom>
-          <a:solidFill>
-            <a:srgbClr val="2D3748"/>
-          </a:solidFill>
-          <a:ln/>
-        </p:spPr>
-        <p:txBody>
-          <a:bodyPr wrap="square" rtlCol="0" anchor="ctr"/>
-          <a:lstStyle/>
-          <a:p>
-            <a:pPr indent="0" marL="0">
-              <a:buNone/>
-            </a:pPr>
-            <a:endParaRPr lang="en-US" dirty="0"/>
+            <a:off x="507950" y="381000"/>
+            <a:ext cx="8290661" cy="428625"/>
+          </a:xfrm>
+          <a:prstGeom prst="rect">
+            <a:avLst/>
+          </a:prstGeom>
+          <a:noFill/>
+          <a:ln/>
+        </p:spPr>
+        <p:txBody>
+          <a:bodyPr wrap="square" lIns="0" tIns="0" rIns="0" bIns="0" rtlCol="0" anchor="t"/>
+          <a:lstStyle/>
+          <a:p>
+            <a:pPr algn="l" indent="0" marL="0">
+              <a:spcBef>
+                <a:spcPts val="3000"/>
+              </a:spcBef>
+              <a:spcAft>
+                <a:spcPts val="1500"/>
+              </a:spcAft>
+              <a:buNone/>
+            </a:pPr>
+            <a:r>
+              <a:rPr lang="en-US" sz="2800" b="1" dirty="0">
+                <a:solidFill>
+                  <a:srgbClr val="FC8181"/>
+                </a:solidFill>
+                <a:latin typeface="Arial" pitchFamily="34" charset="0"/>
+                <a:ea typeface="Arial" pitchFamily="34" charset="-122"/>
+                <a:cs typeface="Arial" pitchFamily="34" charset="-120"/>
+              </a:rPr>
+              <a:t>Discovery: Understanding Your Goals</a:t>
+            </a:r>
+            <a:endParaRPr lang="en-US" sz="2800" dirty="0"/>
           </a:p>
         </p:txBody>
       </p:sp>
@@ -1651,8 +3568,8 @@
         </p:nvSpPr>
         <p:spPr>
           <a:xfrm>
-            <a:off x="507950" y="171450"/>
-            <a:ext cx="4537139" cy="428625"/>
+            <a:off x="507950" y="1000125"/>
+            <a:ext cx="8128099" cy="3251002"/>
           </a:xfrm>
           <a:prstGeom prst="rect">
             <a:avLst/>
@@ -1661,51 +3578,222 @@
           <a:ln/>
         </p:spPr>
         <p:txBody>
-          <a:bodyPr wrap="square" lIns="0" tIns="0" rIns="0" bIns="0" rtlCol="0" anchor="t"/>
-          <a:lstStyle/>
+          <a:bodyPr wrap="square" lIns="254000" tIns="0" rIns="0" bIns="0" rtlCol="0" anchor="t"/>
+          <a:lstStyle/>
+          <a:p>
+            <a:pPr algn="l" marL="254000" indent="-254000">
+              <a:lnSpc>
+                <a:spcPts val="2600"/>
+              </a:lnSpc>
+              <a:spcAft>
+                <a:spcPts val="2000"/>
+              </a:spcAft>
+              <a:buSzPct val="100000"/>
+              <a:buChar char="•"/>
+            </a:pPr>
+            <a:r>
+              <a:rPr lang="en-US" sz="2000" dirty="0">
+                <a:solidFill>
+                  <a:srgbClr val="CBD5E0"/>
+                </a:solidFill>
+                <a:latin typeface="Arial" pitchFamily="34" charset="0"/>
+                <a:ea typeface="Arial" pitchFamily="34" charset="-122"/>
+                <a:cs typeface="Arial" pitchFamily="34" charset="-120"/>
+              </a:rPr>
+              <a:t>Have you looked into going solar before?</a:t>
+            </a:r>
+            <a:endParaRPr lang="en-US" sz="2000" dirty="0"/>
+          </a:p>
+          <a:p>
+            <a:pPr algn="l" marL="254000" indent="-254000">
+              <a:lnSpc>
+                <a:spcPts val="2600"/>
+              </a:lnSpc>
+              <a:spcAft>
+                <a:spcPts val="2000"/>
+              </a:spcAft>
+              <a:buSzPct val="100000"/>
+              <a:buChar char="•"/>
+            </a:pPr>
+            <a:r>
+              <a:rPr lang="en-US" sz="2000" dirty="0">
+                <a:solidFill>
+                  <a:srgbClr val="CBD5E0"/>
+                </a:solidFill>
+                <a:latin typeface="Arial" pitchFamily="34" charset="0"/>
+                <a:ea typeface="Arial" pitchFamily="34" charset="-122"/>
+                <a:cs typeface="Arial" pitchFamily="34" charset="-120"/>
+              </a:rPr>
+              <a:t>Which matters most to you right now? </a:t>
+            </a:r>
+            <a:endParaRPr lang="en-US" sz="2000" dirty="0"/>
+          </a:p>
+          <a:p>
+            <a:pPr algn="l" marL="254000" indent="-254000">
+              <a:lnSpc>
+                <a:spcPts val="2600"/>
+              </a:lnSpc>
+              <a:spcAft>
+                <a:spcPts val="2000"/>
+              </a:spcAft>
+              <a:buSzPct val="100000"/>
+              <a:buChar char="•"/>
+            </a:pPr>
+            <a:endParaRPr lang="en-US" sz="2000" dirty="0"/>
+          </a:p>
+          <a:p>
+            <a:pPr algn="l" marL="254000" indent="-254000">
+              <a:lnSpc>
+                <a:spcPts val="2600"/>
+              </a:lnSpc>
+              <a:spcAft>
+                <a:spcPts val="2000"/>
+              </a:spcAft>
+              <a:buSzPct val="100000"/>
+              <a:buChar char="•"/>
+            </a:pPr>
+            <a:r>
+              <a:rPr lang="en-US" sz="2000" dirty="0">
+                <a:solidFill>
+                  <a:srgbClr val="CBD5E0"/>
+                </a:solidFill>
+                <a:latin typeface="Arial" pitchFamily="34" charset="0"/>
+                <a:ea typeface="Arial" pitchFamily="34" charset="-122"/>
+                <a:cs typeface="Arial" pitchFamily="34" charset="-120"/>
+              </a:rPr>
+              <a:t> </a:t>
+            </a:r>
+            <a:endParaRPr lang="en-US" sz="2000" dirty="0"/>
+          </a:p>
           <a:p>
             <a:pPr algn="l" indent="0" marL="0">
-              <a:buNone/>
-            </a:pPr>
-            <a:r>
-              <a:rPr lang="en-US" sz="2800" b="1" dirty="0">
-                <a:solidFill>
-                  <a:srgbClr val="63B3ED"/>
-                </a:solidFill>
-                <a:latin typeface="Arial" pitchFamily="34" charset="0"/>
-                <a:ea typeface="Arial" pitchFamily="34" charset="-122"/>
-                <a:cs typeface="Arial" pitchFamily="34" charset="-120"/>
-              </a:rPr>
-              <a:t>The 3 Pillars of Ownership</a:t>
-            </a:r>
-            <a:endParaRPr lang="en-US" sz="2800" dirty="0"/>
-          </a:p>
-        </p:txBody>
-      </p:sp>
-      <p:pic>
-        <p:nvPicPr>
-          <p:cNvPr id="4" name="Image 0" descr="C:\Users\12132\Desktop\Antigravity Solar Sales Trainer Agent\solar-trainer\presentation_gen\three_reasons_shield.png">    </p:cNvPr>
-          <p:cNvPicPr>
-            <a:picLocks noChangeAspect="1"/>
-          </p:cNvPicPr>
-          <p:nvPr/>
-        </p:nvPicPr>
-        <p:blipFill>
-          <a:blip r:embed="rId1"/>
-          <a:stretch>
-            <a:fillRect/>
-          </a:stretch>
-        </p:blipFill>
-        <p:spPr>
-          <a:xfrm>
-            <a:off x="762000" y="1052513"/>
-            <a:ext cx="7620000" cy="3810000"/>
-          </a:xfrm>
-          <a:prstGeom prst="rect">
-            <a:avLst/>
-          </a:prstGeom>
-        </p:spPr>
-      </p:pic>
+              <a:lnSpc>
+                <a:spcPts val="2600"/>
+              </a:lnSpc>
+              <a:spcAft>
+                <a:spcPts val="2000"/>
+              </a:spcAft>
+              <a:buNone/>
+            </a:pPr>
+            <a:r>
+              <a:rPr lang="en-US" sz="2000" dirty="0">
+                <a:solidFill>
+                  <a:srgbClr val="CBD5E0"/>
+                </a:solidFill>
+                <a:latin typeface="Arial" pitchFamily="34" charset="0"/>
+                <a:ea typeface="Arial" pitchFamily="34" charset="-122"/>
+                <a:cs typeface="Arial" pitchFamily="34" charset="-120"/>
+              </a:rPr>
+              <a:t>💰 Saving Money</a:t>
+            </a:r>
+            <a:pPr algn="l" indent="0" marL="0">
+              <a:lnSpc>
+                <a:spcPts val="2600"/>
+              </a:lnSpc>
+              <a:spcAft>
+                <a:spcPts val="2000"/>
+              </a:spcAft>
+              <a:buNone/>
+            </a:pPr>
+            <a:r>
+              <a:rPr lang="en-US" sz="2000" dirty="0">
+                <a:solidFill>
+                  <a:srgbClr val="CBD5E0"/>
+                </a:solidFill>
+                <a:latin typeface="Arial" pitchFamily="34" charset="0"/>
+                <a:ea typeface="Arial" pitchFamily="34" charset="-122"/>
+                <a:cs typeface="Arial" pitchFamily="34" charset="-120"/>
+              </a:rPr>
+              <a:t> </a:t>
+            </a:r>
+            <a:pPr algn="l" indent="0" marL="0">
+              <a:lnSpc>
+                <a:spcPts val="2600"/>
+              </a:lnSpc>
+              <a:spcAft>
+                <a:spcPts val="2000"/>
+              </a:spcAft>
+              <a:buNone/>
+            </a:pPr>
+            <a:r>
+              <a:rPr lang="en-US" sz="2000" dirty="0">
+                <a:solidFill>
+                  <a:srgbClr val="CBD5E0"/>
+                </a:solidFill>
+                <a:latin typeface="Arial" pitchFamily="34" charset="0"/>
+                <a:ea typeface="Arial" pitchFamily="34" charset="-122"/>
+                <a:cs typeface="Arial" pitchFamily="34" charset="-120"/>
+              </a:rPr>
+              <a:t>🛡️ Rate Protection</a:t>
+            </a:r>
+            <a:pPr algn="l" indent="0" marL="0">
+              <a:lnSpc>
+                <a:spcPts val="2600"/>
+              </a:lnSpc>
+              <a:spcAft>
+                <a:spcPts val="2000"/>
+              </a:spcAft>
+              <a:buNone/>
+            </a:pPr>
+            <a:r>
+              <a:rPr lang="en-US" sz="2000" dirty="0">
+                <a:solidFill>
+                  <a:srgbClr val="CBD5E0"/>
+                </a:solidFill>
+                <a:latin typeface="Arial" pitchFamily="34" charset="0"/>
+                <a:ea typeface="Arial" pitchFamily="34" charset="-122"/>
+                <a:cs typeface="Arial" pitchFamily="34" charset="-120"/>
+              </a:rPr>
+              <a:t> </a:t>
+            </a:r>
+            <a:pPr algn="l" indent="0" marL="0">
+              <a:lnSpc>
+                <a:spcPts val="2600"/>
+              </a:lnSpc>
+              <a:spcAft>
+                <a:spcPts val="2000"/>
+              </a:spcAft>
+              <a:buNone/>
+            </a:pPr>
+            <a:r>
+              <a:rPr lang="en-US" sz="2000" dirty="0">
+                <a:solidFill>
+                  <a:srgbClr val="CBD5E0"/>
+                </a:solidFill>
+                <a:latin typeface="Arial" pitchFamily="34" charset="0"/>
+                <a:ea typeface="Arial" pitchFamily="34" charset="-122"/>
+                <a:cs typeface="Arial" pitchFamily="34" charset="-120"/>
+              </a:rPr>
+              <a:t>🌱 Going Green</a:t>
+            </a:r>
+            <a:endParaRPr lang="en-US" sz="2000" dirty="0"/>
+          </a:p>
+          <a:p>
+            <a:pPr algn="l" marL="254000" indent="-254000">
+              <a:lnSpc>
+                <a:spcPts val="2600"/>
+              </a:lnSpc>
+              <a:spcAft>
+                <a:spcPts val="2000"/>
+              </a:spcAft>
+              <a:buSzPct val="100000"/>
+              <a:buChar char="•"/>
+            </a:pPr>
+            <a:r>
+              <a:rPr lang="en-US" sz="2000" dirty="0">
+                <a:solidFill>
+                  <a:srgbClr val="CBD5E0"/>
+                </a:solidFill>
+                <a:latin typeface="Arial" pitchFamily="34" charset="0"/>
+                <a:ea typeface="Arial" pitchFamily="34" charset="-122"/>
+                <a:cs typeface="Arial" pitchFamily="34" charset="-120"/>
+              </a:rPr>
+              <a:t>Do you anticipate your energy usage going up? (EV, Pool, AC)</a:t>
+            </a:r>
+            <a:endParaRPr lang="en-US" sz="2000" dirty="0"/>
+          </a:p>
+        </p:txBody>
+      </p:sp>
     </p:spTree>
   </p:cSld>
   <p:clrMapOvr>
@@ -1746,8 +3834,8 @@
         </p:nvSpPr>
         <p:spPr>
           <a:xfrm>
-            <a:off x="507950" y="663476"/>
-            <a:ext cx="4145331" cy="495300"/>
+            <a:off x="507950" y="639812"/>
+            <a:ext cx="4145331" cy="857250"/>
           </a:xfrm>
           <a:prstGeom prst="rect">
             <a:avLst/>
@@ -1761,7 +3849,7 @@
           <a:p>
             <a:pPr algn="l" indent="0" marL="0">
               <a:spcBef>
-                <a:spcPts val="2144"/>
+                <a:spcPts val="1876"/>
               </a:spcBef>
               <a:spcAft>
                 <a:spcPts val="2000"/>
@@ -1769,17 +3857,17 @@
               <a:buNone/>
             </a:pPr>
             <a:r>
-              <a:rPr lang="en-US" sz="3200" b="1" dirty="0">
-                <a:solidFill>
-                  <a:srgbClr val="F6AD55"/>
-                </a:solidFill>
-                <a:latin typeface="Arial" pitchFamily="34" charset="0"/>
-                <a:ea typeface="Arial" pitchFamily="34" charset="-122"/>
-                <a:cs typeface="Arial" pitchFamily="34" charset="-120"/>
-              </a:rPr>
-              <a:t>The Value Stack</a:t>
-            </a:r>
-            <a:endParaRPr lang="en-US" sz="3200" dirty="0"/>
+              <a:rPr lang="en-US" sz="2800" b="1" dirty="0">
+                <a:solidFill>
+                  <a:srgbClr val="FC8181"/>
+                </a:solidFill>
+                <a:latin typeface="Arial" pitchFamily="34" charset="0"/>
+                <a:ea typeface="Arial" pitchFamily="34" charset="-122"/>
+                <a:cs typeface="Arial" pitchFamily="34" charset="-120"/>
+              </a:rPr>
+              <a:t>The Problem: Traditional Energy</a:t>
+            </a:r>
+            <a:endParaRPr lang="en-US" sz="2800" dirty="0"/>
           </a:p>
         </p:txBody>
       </p:sp>
@@ -1791,8 +3879,8 @@
         </p:nvSpPr>
         <p:spPr>
           <a:xfrm>
-            <a:off x="507950" y="1666577"/>
-            <a:ext cx="4064050" cy="2831902"/>
+            <a:off x="507950" y="1979563"/>
+            <a:ext cx="4145331" cy="352425"/>
           </a:xfrm>
           <a:prstGeom prst="rect">
             <a:avLst/>
@@ -1801,41 +3889,23 @@
           <a:ln/>
         </p:spPr>
         <p:txBody>
-          <a:bodyPr wrap="square" lIns="127000" tIns="0" rIns="0" bIns="0" rtlCol="0" anchor="t"/>
-          <a:lstStyle/>
-          <a:p>
-            <a:pPr algn="l" marL="127000" indent="-127000">
-              <a:lnSpc>
-                <a:spcPts val="3600"/>
-              </a:lnSpc>
-              <a:spcAft>
-                <a:spcPts val="1000"/>
-              </a:spcAft>
-              <a:buSzPct val="100000"/>
-              <a:buChar char="•"/>
-            </a:pPr>
-            <a:r>
-              <a:rPr lang="en-US" sz="2000" b="1" dirty="0">
-                <a:solidFill>
-                  <a:srgbClr val="CBD5E0"/>
-                </a:solidFill>
-                <a:latin typeface="Arial" pitchFamily="34" charset="0"/>
-                <a:ea typeface="Arial" pitchFamily="34" charset="-122"/>
-                <a:cs typeface="Arial" pitchFamily="34" charset="-120"/>
-              </a:rPr>
-              <a:t>Fixed Cost:</a:t>
-            </a:r>
+          <a:bodyPr wrap="square" lIns="0" tIns="0" rIns="0" bIns="0" rtlCol="0" anchor="t"/>
+          <a:lstStyle/>
+          <a:p>
             <a:pPr algn="l" indent="0" marL="0">
               <a:lnSpc>
-                <a:spcPts val="3600"/>
+                <a:spcPts val="2700"/>
               </a:lnSpc>
-              <a:spcAft>
-                <a:spcPts val="1000"/>
-              </a:spcAft>
-              <a:buNone/>
-            </a:pPr>
-            <a:r>
-              <a:rPr lang="en-US" sz="2000" dirty="0">
+              <a:spcBef>
+                <a:spcPts val="1800"/>
+              </a:spcBef>
+              <a:spcAft>
+                <a:spcPts val="1500"/>
+              </a:spcAft>
+              <a:buNone/>
+            </a:pPr>
+            <a:r>
+              <a:rPr lang="en-US" sz="1800" dirty="0">
                 <a:solidFill>
                   <a:srgbClr val="CBD5E0"/>
                 </a:solidFill>
@@ -1843,43 +3913,22 @@
                 <a:ea typeface="Arial" pitchFamily="34" charset="-122"/>
                 <a:cs typeface="Arial" pitchFamily="34" charset="-120"/>
               </a:rPr>
-              <a:t> Inflation Proof</a:t>
-            </a:r>
-            <a:endParaRPr lang="en-US" sz="2000" dirty="0"/>
-          </a:p>
-          <a:p>
-            <a:pPr algn="l" marL="127000" indent="-127000">
-              <a:lnSpc>
-                <a:spcPts val="3600"/>
-              </a:lnSpc>
-              <a:spcAft>
-                <a:spcPts val="1000"/>
-              </a:spcAft>
-              <a:buSzPct val="100000"/>
-              <a:buChar char="•"/>
-            </a:pPr>
-            <a:r>
-              <a:rPr lang="en-US" sz="2000" b="1" dirty="0">
-                <a:solidFill>
-                  <a:srgbClr val="CBD5E0"/>
-                </a:solidFill>
-                <a:latin typeface="Arial" pitchFamily="34" charset="0"/>
-                <a:ea typeface="Arial" pitchFamily="34" charset="-122"/>
-                <a:cs typeface="Arial" pitchFamily="34" charset="-120"/>
-              </a:rPr>
-              <a:t>Equity:</a:t>
+              <a:t>You are in an </a:t>
             </a:r>
             <a:pPr algn="l" indent="0" marL="0">
               <a:lnSpc>
-                <a:spcPts val="3600"/>
+                <a:spcPts val="2700"/>
               </a:lnSpc>
-              <a:spcAft>
-                <a:spcPts val="1000"/>
-              </a:spcAft>
-              <a:buNone/>
-            </a:pPr>
-            <a:r>
-              <a:rPr lang="en-US" sz="2000" dirty="0">
+              <a:spcBef>
+                <a:spcPts val="1800"/>
+              </a:spcBef>
+              <a:spcAft>
+                <a:spcPts val="1500"/>
+              </a:spcAft>
+              <a:buNone/>
+            </a:pPr>
+            <a:r>
+              <a:rPr lang="en-US" sz="1800" b="1" dirty="0">
                 <a:solidFill>
                   <a:srgbClr val="CBD5E0"/>
                 </a:solidFill>
@@ -1887,43 +3936,22 @@
                 <a:ea typeface="Arial" pitchFamily="34" charset="-122"/>
                 <a:cs typeface="Arial" pitchFamily="34" charset="-120"/>
               </a:rPr>
-              <a:t> ~4% Home Value Increase</a:t>
-            </a:r>
-            <a:endParaRPr lang="en-US" sz="2000" dirty="0"/>
-          </a:p>
-          <a:p>
-            <a:pPr algn="l" marL="127000" indent="-127000">
-              <a:lnSpc>
-                <a:spcPts val="3600"/>
-              </a:lnSpc>
-              <a:spcAft>
-                <a:spcPts val="1000"/>
-              </a:spcAft>
-              <a:buSzPct val="100000"/>
-              <a:buChar char="•"/>
-            </a:pPr>
-            <a:r>
-              <a:rPr lang="en-US" sz="2000" b="1" dirty="0">
-                <a:solidFill>
-                  <a:srgbClr val="CBD5E0"/>
-                </a:solidFill>
-                <a:latin typeface="Arial" pitchFamily="34" charset="0"/>
-                <a:ea typeface="Arial" pitchFamily="34" charset="-122"/>
-                <a:cs typeface="Arial" pitchFamily="34" charset="-120"/>
-              </a:rPr>
-              <a:t>Incentives:</a:t>
+              <a:t>infinite lease</a:t>
             </a:r>
             <a:pPr algn="l" indent="0" marL="0">
               <a:lnSpc>
-                <a:spcPts val="3600"/>
+                <a:spcPts val="2700"/>
               </a:lnSpc>
-              <a:spcAft>
-                <a:spcPts val="1000"/>
-              </a:spcAft>
-              <a:buNone/>
-            </a:pPr>
-            <a:r>
-              <a:rPr lang="en-US" sz="2000" dirty="0">
+              <a:spcBef>
+                <a:spcPts val="1800"/>
+              </a:spcBef>
+              <a:spcAft>
+                <a:spcPts val="1500"/>
+              </a:spcAft>
+              <a:buNone/>
+            </a:pPr>
+            <a:r>
+              <a:rPr lang="en-US" sz="1800" dirty="0">
                 <a:solidFill>
                   <a:srgbClr val="CBD5E0"/>
                 </a:solidFill>
@@ -1931,43 +3959,47 @@
                 <a:ea typeface="Arial" pitchFamily="34" charset="-122"/>
                 <a:cs typeface="Arial" pitchFamily="34" charset="-120"/>
               </a:rPr>
-              <a:t> 30% Federal ITC</a:t>
-            </a:r>
-            <a:endParaRPr lang="en-US" sz="2000" dirty="0"/>
-          </a:p>
-          <a:p>
-            <a:pPr algn="l" marL="127000" indent="-127000">
-              <a:lnSpc>
-                <a:spcPts val="3600"/>
-              </a:lnSpc>
-              <a:spcAft>
-                <a:spcPts val="1000"/>
-              </a:spcAft>
-              <a:buSzPct val="100000"/>
-              <a:buChar char="•"/>
-            </a:pPr>
-            <a:r>
-              <a:rPr lang="en-US" sz="2000" b="1" dirty="0">
-                <a:solidFill>
-                  <a:srgbClr val="CBD5E0"/>
-                </a:solidFill>
-                <a:latin typeface="Arial" pitchFamily="34" charset="0"/>
-                <a:ea typeface="Arial" pitchFamily="34" charset="-122"/>
-                <a:cs typeface="Arial" pitchFamily="34" charset="-120"/>
-              </a:rPr>
-              <a:t>Control:</a:t>
-            </a:r>
+              <a:t>.</a:t>
+            </a:r>
+            <a:endParaRPr lang="en-US" sz="1800" dirty="0"/>
+          </a:p>
+        </p:txBody>
+      </p:sp>
+      <p:sp>
+        <p:nvSpPr>
+          <p:cNvPr id="4" name="Text 2"/>
+          <p:cNvSpPr/>
+          <p:nvPr/>
+        </p:nvSpPr>
+        <p:spPr>
+          <a:xfrm>
+            <a:off x="507950" y="2751088"/>
+            <a:ext cx="4145331" cy="695325"/>
+          </a:xfrm>
+          <a:prstGeom prst="rect">
+            <a:avLst/>
+          </a:prstGeom>
+          <a:noFill/>
+          <a:ln/>
+        </p:spPr>
+        <p:txBody>
+          <a:bodyPr wrap="square" lIns="0" tIns="0" rIns="0" bIns="0" rtlCol="0" anchor="t"/>
+          <a:lstStyle/>
+          <a:p>
             <a:pPr algn="l" indent="0" marL="0">
               <a:lnSpc>
-                <a:spcPts val="3600"/>
+                <a:spcPts val="2700"/>
               </a:lnSpc>
-              <a:spcAft>
-                <a:spcPts val="1000"/>
-              </a:spcAft>
-              <a:buNone/>
-            </a:pPr>
-            <a:r>
-              <a:rPr lang="en-US" sz="2000" dirty="0">
+              <a:spcBef>
+                <a:spcPts val="1800"/>
+              </a:spcBef>
+              <a:spcAft>
+                <a:spcPts val="1500"/>
+              </a:spcAft>
+              <a:buNone/>
+            </a:pPr>
+            <a:r>
+              <a:rPr lang="en-US" sz="1800" dirty="0">
                 <a:solidFill>
                   <a:srgbClr val="CBD5E0"/>
                 </a:solidFill>
@@ -1975,15 +4007,109 @@
                 <a:ea typeface="Arial" pitchFamily="34" charset="-122"/>
                 <a:cs typeface="Arial" pitchFamily="34" charset="-120"/>
               </a:rPr>
-              <a:t> Own vs Rent</a:t>
-            </a:r>
-            <a:endParaRPr lang="en-US" sz="2000" dirty="0"/>
-          </a:p>
-        </p:txBody>
-      </p:sp>
-      <p:sp>
-        <p:nvSpPr>
-          <p:cNvPr id="4" name="Text 2"/>
+              <a:t>Utility rates have risen an average of </a:t>
+            </a:r>
+            <a:pPr algn="l" indent="0" marL="0">
+              <a:lnSpc>
+                <a:spcPts val="2700"/>
+              </a:lnSpc>
+              <a:spcBef>
+                <a:spcPts val="1800"/>
+              </a:spcBef>
+              <a:spcAft>
+                <a:spcPts val="1500"/>
+              </a:spcAft>
+              <a:buNone/>
+            </a:pPr>
+            <a:r>
+              <a:rPr lang="en-US" sz="1800" b="1" dirty="0">
+                <a:solidFill>
+                  <a:srgbClr val="CBD5E0"/>
+                </a:solidFill>
+                <a:latin typeface="Arial" pitchFamily="34" charset="0"/>
+                <a:ea typeface="Arial" pitchFamily="34" charset="-122"/>
+                <a:cs typeface="Arial" pitchFamily="34" charset="-120"/>
+              </a:rPr>
+              <a:t>6% per year</a:t>
+            </a:r>
+            <a:pPr algn="l" indent="0" marL="0">
+              <a:lnSpc>
+                <a:spcPts val="2700"/>
+              </a:lnSpc>
+              <a:spcBef>
+                <a:spcPts val="1800"/>
+              </a:spcBef>
+              <a:spcAft>
+                <a:spcPts val="1500"/>
+              </a:spcAft>
+              <a:buNone/>
+            </a:pPr>
+            <a:r>
+              <a:rPr lang="en-US" sz="1800" dirty="0">
+                <a:solidFill>
+                  <a:srgbClr val="CBD5E0"/>
+                </a:solidFill>
+                <a:latin typeface="Arial" pitchFamily="34" charset="0"/>
+                <a:ea typeface="Arial" pitchFamily="34" charset="-122"/>
+                <a:cs typeface="Arial" pitchFamily="34" charset="-120"/>
+              </a:rPr>
+              <a:t>.</a:t>
+            </a:r>
+            <a:endParaRPr lang="en-US" sz="1800" dirty="0"/>
+          </a:p>
+        </p:txBody>
+      </p:sp>
+      <p:sp>
+        <p:nvSpPr>
+          <p:cNvPr id="5" name="Text 3"/>
+          <p:cNvSpPr/>
+          <p:nvPr/>
+        </p:nvSpPr>
+        <p:spPr>
+          <a:xfrm>
+            <a:off x="507950" y="3865513"/>
+            <a:ext cx="4145331" cy="685800"/>
+          </a:xfrm>
+          <a:prstGeom prst="rect">
+            <a:avLst/>
+          </a:prstGeom>
+          <a:noFill/>
+          <a:ln/>
+        </p:spPr>
+        <p:txBody>
+          <a:bodyPr wrap="square" lIns="0" tIns="0" rIns="0" bIns="0" rtlCol="0" anchor="t"/>
+          <a:lstStyle/>
+          <a:p>
+            <a:pPr algn="l" indent="0" marL="0">
+              <a:lnSpc>
+                <a:spcPts val="2700"/>
+              </a:lnSpc>
+              <a:spcBef>
+                <a:spcPts val="1800"/>
+              </a:spcBef>
+              <a:spcAft>
+                <a:spcPts val="1500"/>
+              </a:spcAft>
+              <a:buNone/>
+            </a:pPr>
+            <a:r>
+              <a:rPr lang="en-US" sz="1800" dirty="0">
+                <a:solidFill>
+                  <a:srgbClr val="CBD5E0"/>
+                </a:solidFill>
+                <a:latin typeface="Arial" pitchFamily="34" charset="0"/>
+                <a:ea typeface="Arial" pitchFamily="34" charset="-122"/>
+                <a:cs typeface="Arial" pitchFamily="34" charset="-120"/>
+              </a:rPr>
+              <a:t>You pay for Generation, Transmission, and Distribution.</a:t>
+            </a:r>
+            <a:endParaRPr lang="en-US" sz="1800" dirty="0"/>
+          </a:p>
+        </p:txBody>
+      </p:sp>
+      <p:sp>
+        <p:nvSpPr>
+          <p:cNvPr id="6" name="Text 4"/>
           <p:cNvSpPr/>
           <p:nvPr/>
         </p:nvSpPr>
@@ -2011,30 +4137,90 @@
           </a:p>
         </p:txBody>
       </p:sp>
-      <p:pic>
-        <p:nvPicPr>
-          <p:cNvPr id="5" name="Image 0" descr="C:\Users\12132\Desktop\Antigravity Solar Sales Trainer Agent\solar-trainer\presentation_gen\value_stack_pyramid.png">    </p:cNvPr>
-          <p:cNvPicPr>
-            <a:picLocks noChangeAspect="1"/>
-          </p:cNvPicPr>
-          <p:nvPr/>
-        </p:nvPicPr>
-        <p:blipFill>
-          <a:blip r:embed="rId1"/>
-          <a:stretch>
-            <a:fillRect/>
-          </a:stretch>
-        </p:blipFill>
-        <p:spPr>
-          <a:xfrm>
-            <a:off x="5283101" y="666750"/>
-            <a:ext cx="3657600" cy="3810000"/>
-          </a:xfrm>
-          <a:prstGeom prst="rect">
-            <a:avLst/>
-          </a:prstGeom>
-        </p:spPr>
-      </p:pic>
+      <p:sp>
+        <p:nvSpPr>
+          <p:cNvPr id="7" name="Text 5"/>
+          <p:cNvSpPr/>
+          <p:nvPr/>
+        </p:nvSpPr>
+        <p:spPr>
+          <a:xfrm>
+            <a:off x="6232648" y="1981200"/>
+            <a:ext cx="1758506" cy="914400"/>
+          </a:xfrm>
+          <a:prstGeom prst="rect">
+            <a:avLst/>
+          </a:prstGeom>
+          <a:noFill/>
+          <a:ln/>
+        </p:spPr>
+        <p:txBody>
+          <a:bodyPr wrap="square" lIns="0" tIns="0" rIns="0" bIns="0" rtlCol="0" anchor="t"/>
+          <a:lstStyle/>
+          <a:p>
+            <a:pPr algn="ctr" indent="0" marL="0">
+              <a:lnSpc>
+                <a:spcPts val="7200"/>
+              </a:lnSpc>
+              <a:buNone/>
+            </a:pPr>
+            <a:r>
+              <a:rPr lang="en-US" sz="4800" b="1" dirty="0">
+                <a:solidFill>
+                  <a:srgbClr val="F6AD55"/>
+                </a:solidFill>
+                <a:latin typeface="Arial" pitchFamily="34" charset="0"/>
+                <a:ea typeface="Arial" pitchFamily="34" charset="-122"/>
+                <a:cs typeface="Arial" pitchFamily="34" charset="-120"/>
+              </a:rPr>
+              <a:t>+6%</a:t>
+            </a:r>
+            <a:endParaRPr lang="en-US" sz="4800" dirty="0"/>
+          </a:p>
+        </p:txBody>
+      </p:sp>
+      <p:sp>
+        <p:nvSpPr>
+          <p:cNvPr id="8" name="Text 6"/>
+          <p:cNvSpPr/>
+          <p:nvPr/>
+        </p:nvSpPr>
+        <p:spPr>
+          <a:xfrm>
+            <a:off x="6232648" y="2895600"/>
+            <a:ext cx="1758506" cy="266700"/>
+          </a:xfrm>
+          <a:prstGeom prst="rect">
+            <a:avLst/>
+          </a:prstGeom>
+          <a:noFill/>
+          <a:ln/>
+        </p:spPr>
+        <p:txBody>
+          <a:bodyPr wrap="square" lIns="0" tIns="0" rIns="0" bIns="0" rtlCol="0" anchor="t"/>
+          <a:lstStyle/>
+          <a:p>
+            <a:pPr algn="ctr" indent="0" marL="0">
+              <a:lnSpc>
+                <a:spcPts val="2100"/>
+              </a:lnSpc>
+              <a:buNone/>
+            </a:pPr>
+            <a:r>
+              <a:rPr lang="en-US" sz="1400" dirty="0">
+                <a:solidFill>
+                  <a:srgbClr val="A0AEC0"/>
+                </a:solidFill>
+                <a:latin typeface="Arial" pitchFamily="34" charset="0"/>
+                <a:ea typeface="Arial" pitchFamily="34" charset="-122"/>
+                <a:cs typeface="Arial" pitchFamily="34" charset="-120"/>
+              </a:rPr>
+              <a:t>Annual Rate Increase</a:t>
+            </a:r>
+            <a:endParaRPr lang="en-US" sz="1400" dirty="0"/>
+          </a:p>
+        </p:txBody>
+      </p:sp>
     </p:spTree>
   </p:cSld>
   <p:clrMapOvr>
@@ -2075,8 +4261,8 @@
         </p:nvSpPr>
         <p:spPr>
           <a:xfrm>
-            <a:off x="1643063" y="1323975"/>
-            <a:ext cx="5975033" cy="552450"/>
+            <a:off x="507950" y="606475"/>
+            <a:ext cx="4145331" cy="857250"/>
           </a:xfrm>
           <a:prstGeom prst="rect">
             <a:avLst/>
@@ -2090,25 +4276,25 @@
           <a:p>
             <a:pPr algn="l" indent="0" marL="0">
               <a:spcBef>
-                <a:spcPts val="2412"/>
+                <a:spcPts val="1876"/>
               </a:spcBef>
               <a:spcAft>
-                <a:spcPts val="2412"/>
-              </a:spcAft>
-              <a:buNone/>
-            </a:pPr>
-            <a:r>
-              <a:rPr lang="en-US" sz="3600" b="1" dirty="0">
-                <a:solidFill>
-                  <a:srgbClr val="FFFFFF"/>
-                </a:solidFill>
-                <a:latin typeface="Arial" pitchFamily="34" charset="0"/>
-                <a:ea typeface="Arial" pitchFamily="34" charset="-122"/>
-                <a:cs typeface="Arial" pitchFamily="34" charset="-120"/>
-              </a:rPr>
-              <a:t>Ready to own your power?</a:t>
-            </a:r>
-            <a:endParaRPr lang="en-US" sz="3600" dirty="0"/>
+                <a:spcPts val="2000"/>
+              </a:spcAft>
+              <a:buNone/>
+            </a:pPr>
+            <a:r>
+              <a:rPr lang="en-US" sz="2800" b="1" dirty="0">
+                <a:solidFill>
+                  <a:srgbClr val="68D391"/>
+                </a:solidFill>
+                <a:latin typeface="Arial" pitchFamily="34" charset="0"/>
+                <a:ea typeface="Arial" pitchFamily="34" charset="-122"/>
+                <a:cs typeface="Arial" pitchFamily="34" charset="-120"/>
+              </a:rPr>
+              <a:t>The Solution: Solar Energy</a:t>
+            </a:r>
+            <a:endParaRPr lang="en-US" sz="2800" dirty="0"/>
           </a:p>
         </p:txBody>
       </p:sp>
@@ -2120,8 +4306,665 @@
         </p:nvSpPr>
         <p:spPr>
           <a:xfrm>
-            <a:off x="3800475" y="2335113"/>
-            <a:ext cx="1573911" cy="180975"/>
+            <a:off x="507950" y="1946225"/>
+            <a:ext cx="4145331" cy="352425"/>
+          </a:xfrm>
+          <a:prstGeom prst="rect">
+            <a:avLst/>
+          </a:prstGeom>
+          <a:noFill/>
+          <a:ln/>
+        </p:spPr>
+        <p:txBody>
+          <a:bodyPr wrap="square" lIns="0" tIns="0" rIns="0" bIns="0" rtlCol="0" anchor="t"/>
+          <a:lstStyle/>
+          <a:p>
+            <a:pPr algn="l" indent="0" marL="0">
+              <a:lnSpc>
+                <a:spcPts val="2700"/>
+              </a:lnSpc>
+              <a:spcBef>
+                <a:spcPts val="1800"/>
+              </a:spcBef>
+              <a:spcAft>
+                <a:spcPts val="1500"/>
+              </a:spcAft>
+              <a:buNone/>
+            </a:pPr>
+            <a:r>
+              <a:rPr lang="en-US" sz="1800" b="1" dirty="0">
+                <a:solidFill>
+                  <a:srgbClr val="CBD5E0"/>
+                </a:solidFill>
+                <a:latin typeface="Arial" pitchFamily="34" charset="0"/>
+                <a:ea typeface="Arial" pitchFamily="34" charset="-122"/>
+                <a:cs typeface="Arial" pitchFamily="34" charset="-120"/>
+              </a:rPr>
+              <a:t>So Simple. So Local.</a:t>
+            </a:r>
+            <a:endParaRPr lang="en-US" sz="1800" dirty="0"/>
+          </a:p>
+        </p:txBody>
+      </p:sp>
+      <p:sp>
+        <p:nvSpPr>
+          <p:cNvPr id="4" name="Text 2"/>
+          <p:cNvSpPr/>
+          <p:nvPr/>
+        </p:nvSpPr>
+        <p:spPr>
+          <a:xfrm>
+            <a:off x="507950" y="2717750"/>
+            <a:ext cx="4145331" cy="342900"/>
+          </a:xfrm>
+          <a:prstGeom prst="rect">
+            <a:avLst/>
+          </a:prstGeom>
+          <a:noFill/>
+          <a:ln/>
+        </p:spPr>
+        <p:txBody>
+          <a:bodyPr wrap="square" lIns="0" tIns="0" rIns="0" bIns="0" rtlCol="0" anchor="t"/>
+          <a:lstStyle/>
+          <a:p>
+            <a:pPr algn="l" indent="0" marL="0">
+              <a:lnSpc>
+                <a:spcPts val="2700"/>
+              </a:lnSpc>
+              <a:spcBef>
+                <a:spcPts val="1800"/>
+              </a:spcBef>
+              <a:spcAft>
+                <a:spcPts val="1500"/>
+              </a:spcAft>
+              <a:buNone/>
+            </a:pPr>
+            <a:r>
+              <a:rPr lang="en-US" sz="1800" dirty="0">
+                <a:solidFill>
+                  <a:srgbClr val="CBD5E0"/>
+                </a:solidFill>
+                <a:latin typeface="Arial" pitchFamily="34" charset="0"/>
+                <a:ea typeface="Arial" pitchFamily="34" charset="-122"/>
+                <a:cs typeface="Arial" pitchFamily="34" charset="-120"/>
+              </a:rPr>
+              <a:t>Avoid the inefficiencies of the grid.</a:t>
+            </a:r>
+            <a:endParaRPr lang="en-US" sz="1800" dirty="0"/>
+          </a:p>
+        </p:txBody>
+      </p:sp>
+      <p:sp>
+        <p:nvSpPr>
+          <p:cNvPr id="5" name="Text 3"/>
+          <p:cNvSpPr/>
+          <p:nvPr/>
+        </p:nvSpPr>
+        <p:spPr>
+          <a:xfrm>
+            <a:off x="507950" y="3479750"/>
+            <a:ext cx="4145331" cy="342900"/>
+          </a:xfrm>
+          <a:prstGeom prst="rect">
+            <a:avLst/>
+          </a:prstGeom>
+          <a:noFill/>
+          <a:ln/>
+        </p:spPr>
+        <p:txBody>
+          <a:bodyPr wrap="square" lIns="0" tIns="0" rIns="0" bIns="0" rtlCol="0" anchor="t"/>
+          <a:lstStyle/>
+          <a:p>
+            <a:pPr algn="l" indent="0" marL="0">
+              <a:lnSpc>
+                <a:spcPts val="2700"/>
+              </a:lnSpc>
+              <a:spcBef>
+                <a:spcPts val="1800"/>
+              </a:spcBef>
+              <a:spcAft>
+                <a:spcPts val="1500"/>
+              </a:spcAft>
+              <a:buNone/>
+            </a:pPr>
+            <a:r>
+              <a:rPr lang="en-US" sz="1800" dirty="0">
+                <a:solidFill>
+                  <a:srgbClr val="CBD5E0"/>
+                </a:solidFill>
+                <a:latin typeface="Arial" pitchFamily="34" charset="0"/>
+                <a:ea typeface="Arial" pitchFamily="34" charset="-122"/>
+                <a:cs typeface="Arial" pitchFamily="34" charset="-120"/>
+              </a:rPr>
+              <a:t>Produce power right on your roof.</a:t>
+            </a:r>
+            <a:endParaRPr lang="en-US" sz="1800" dirty="0"/>
+          </a:p>
+        </p:txBody>
+      </p:sp>
+      <p:sp>
+        <p:nvSpPr>
+          <p:cNvPr id="6" name="Text 4"/>
+          <p:cNvSpPr/>
+          <p:nvPr/>
+        </p:nvSpPr>
+        <p:spPr>
+          <a:xfrm>
+            <a:off x="507950" y="4241750"/>
+            <a:ext cx="4145331" cy="342900"/>
+          </a:xfrm>
+          <a:prstGeom prst="rect">
+            <a:avLst/>
+          </a:prstGeom>
+          <a:noFill/>
+          <a:ln/>
+        </p:spPr>
+        <p:txBody>
+          <a:bodyPr wrap="square" lIns="0" tIns="0" rIns="0" bIns="0" rtlCol="0" anchor="t"/>
+          <a:lstStyle/>
+          <a:p>
+            <a:pPr algn="l" indent="0" marL="0">
+              <a:lnSpc>
+                <a:spcPts val="2700"/>
+              </a:lnSpc>
+              <a:spcBef>
+                <a:spcPts val="1800"/>
+              </a:spcBef>
+              <a:spcAft>
+                <a:spcPts val="1500"/>
+              </a:spcAft>
+              <a:buNone/>
+            </a:pPr>
+            <a:r>
+              <a:rPr lang="en-US" sz="1800" dirty="0">
+                <a:solidFill>
+                  <a:srgbClr val="CBD5E0"/>
+                </a:solidFill>
+                <a:latin typeface="Arial" pitchFamily="34" charset="0"/>
+                <a:ea typeface="Arial" pitchFamily="34" charset="-122"/>
+                <a:cs typeface="Arial" pitchFamily="34" charset="-120"/>
+              </a:rPr>
+              <a:t>Convert liability into an asset.</a:t>
+            </a:r>
+            <a:endParaRPr lang="en-US" sz="1800" dirty="0"/>
+          </a:p>
+        </p:txBody>
+      </p:sp>
+      <p:sp>
+        <p:nvSpPr>
+          <p:cNvPr id="7" name="Text 5"/>
+          <p:cNvSpPr/>
+          <p:nvPr/>
+        </p:nvSpPr>
+        <p:spPr>
+          <a:xfrm>
+            <a:off x="5079950" y="0"/>
+            <a:ext cx="4064050" cy="5143500"/>
+          </a:xfrm>
+          <a:prstGeom prst="rect">
+            <a:avLst/>
+          </a:prstGeom>
+          <a:solidFill>
+            <a:srgbClr val="2D3748"/>
+          </a:solidFill>
+          <a:ln/>
+        </p:spPr>
+        <p:txBody>
+          <a:bodyPr wrap="square" rtlCol="0" anchor="ctr"/>
+          <a:lstStyle/>
+          <a:p>
+            <a:pPr indent="0" marL="0">
+              <a:buNone/>
+            </a:pPr>
+            <a:endParaRPr lang="en-US" dirty="0"/>
+          </a:p>
+        </p:txBody>
+      </p:sp>
+      <p:sp>
+        <p:nvSpPr>
+          <p:cNvPr id="8" name="Text 6"/>
+          <p:cNvSpPr/>
+          <p:nvPr/>
+        </p:nvSpPr>
+        <p:spPr>
+          <a:xfrm>
+            <a:off x="5368826" y="2159050"/>
+            <a:ext cx="3555873" cy="1904851"/>
+          </a:xfrm>
+          <a:prstGeom prst="rect">
+            <a:avLst/>
+          </a:prstGeom>
+          <a:noFill/>
+          <a:ln/>
+        </p:spPr>
+        <p:txBody>
+          <a:bodyPr wrap="square" lIns="0" tIns="0" rIns="0" bIns="0" rtlCol="0" anchor="t"/>
+          <a:lstStyle/>
+          <a:p>
+            <a:pPr algn="l" indent="0" marL="0">
+              <a:lnSpc>
+                <a:spcPts val="15000"/>
+              </a:lnSpc>
+              <a:spcBef>
+                <a:spcPts val="10000"/>
+              </a:spcBef>
+              <a:spcAft>
+                <a:spcPts val="1500"/>
+              </a:spcAft>
+              <a:buNone/>
+            </a:pPr>
+            <a:r>
+              <a:rPr lang="en-US" sz="10000" dirty="0">
+                <a:solidFill>
+                  <a:srgbClr val="CBD5E0"/>
+                </a:solidFill>
+                <a:latin typeface="Arial" pitchFamily="34" charset="0"/>
+                <a:ea typeface="Arial" pitchFamily="34" charset="-122"/>
+                <a:cs typeface="Arial" pitchFamily="34" charset="-120"/>
+              </a:rPr>
+              <a:t>🏡☀️</a:t>
+            </a:r>
+            <a:endParaRPr lang="en-US" sz="10000" dirty="0"/>
+          </a:p>
+        </p:txBody>
+      </p:sp>
+    </p:spTree>
+  </p:cSld>
+  <p:clrMapOvr>
+    <a:masterClrMapping/>
+  </p:clrMapOvr>
+</p:sld>
+</file>
+
+<file path=ppt/slides/slide6.xml><?xml version="1.0" encoding="utf-8"?>
+<p:sld xmlns:a="http://schemas.openxmlformats.org/drawingml/2006/main" xmlns:r="http://schemas.openxmlformats.org/officeDocument/2006/relationships" xmlns:p="http://schemas.openxmlformats.org/presentationml/2006/main">
+  <p:cSld name="Slide 6">
+    <p:bg>
+      <p:bgPr>
+        <a:solidFill>
+          <a:srgbClr val="1A202C"/>
+        </a:solidFill>
+      </p:bgPr>
+    </p:bg>
+    <p:spTree>
+      <p:nvGrpSpPr>
+        <p:cNvPr id="1" name=""/>
+        <p:cNvGrpSpPr/>
+        <p:nvPr/>
+      </p:nvGrpSpPr>
+      <p:grpSpPr>
+        <a:xfrm>
+          <a:off x="0" y="0"/>
+          <a:ext cx="0" cy="0"/>
+          <a:chOff x="0" y="0"/>
+          <a:chExt cx="0" cy="0"/>
+        </a:xfrm>
+      </p:grpSpPr>
+      <p:sp>
+        <p:nvSpPr>
+          <p:cNvPr id="2" name="Text 0"/>
+          <p:cNvSpPr/>
+          <p:nvPr/>
+        </p:nvSpPr>
+        <p:spPr>
+          <a:xfrm>
+            <a:off x="507950" y="950119"/>
+            <a:ext cx="3316325" cy="975420"/>
+          </a:xfrm>
+          <a:prstGeom prst="rect">
+            <a:avLst/>
+          </a:prstGeom>
+          <a:noFill/>
+          <a:ln/>
+        </p:spPr>
+        <p:txBody>
+          <a:bodyPr wrap="square" lIns="0" tIns="0" rIns="0" bIns="0" rtlCol="0" anchor="t"/>
+          <a:lstStyle/>
+          <a:p>
+            <a:pPr algn="l" indent="0" marL="0">
+              <a:lnSpc>
+                <a:spcPts val="3840"/>
+              </a:lnSpc>
+              <a:spcBef>
+                <a:spcPts val="2144"/>
+              </a:spcBef>
+              <a:spcAft>
+                <a:spcPts val="2000"/>
+              </a:spcAft>
+              <a:buNone/>
+            </a:pPr>
+            <a:r>
+              <a:rPr lang="en-US" sz="3200" b="1" dirty="0">
+                <a:solidFill>
+                  <a:srgbClr val="FC8181"/>
+                </a:solidFill>
+                <a:latin typeface="Arial" pitchFamily="34" charset="0"/>
+                <a:ea typeface="Arial" pitchFamily="34" charset="-122"/>
+                <a:cs typeface="Arial" pitchFamily="34" charset="-120"/>
+              </a:rPr>
+              <a:t>The Cost of Doing Nothing</a:t>
+            </a:r>
+            <a:endParaRPr lang="en-US" sz="3200" dirty="0"/>
+          </a:p>
+        </p:txBody>
+      </p:sp>
+      <p:sp>
+        <p:nvSpPr>
+          <p:cNvPr id="3" name="Text 1"/>
+          <p:cNvSpPr/>
+          <p:nvPr/>
+        </p:nvSpPr>
+        <p:spPr>
+          <a:xfrm>
+            <a:off x="507950" y="2408039"/>
+            <a:ext cx="3316325" cy="685800"/>
+          </a:xfrm>
+          <a:prstGeom prst="rect">
+            <a:avLst/>
+          </a:prstGeom>
+          <a:noFill/>
+          <a:ln/>
+        </p:spPr>
+        <p:txBody>
+          <a:bodyPr wrap="square" lIns="0" tIns="0" rIns="0" bIns="0" rtlCol="0" anchor="t"/>
+          <a:lstStyle/>
+          <a:p>
+            <a:pPr algn="l" indent="0" marL="0">
+              <a:lnSpc>
+                <a:spcPts val="2700"/>
+              </a:lnSpc>
+              <a:spcBef>
+                <a:spcPts val="1800"/>
+              </a:spcBef>
+              <a:spcAft>
+                <a:spcPts val="1800"/>
+              </a:spcAft>
+              <a:buNone/>
+            </a:pPr>
+            <a:r>
+              <a:rPr lang="en-US" sz="1800" dirty="0">
+                <a:solidFill>
+                  <a:srgbClr val="CBD5E0"/>
+                </a:solidFill>
+                <a:latin typeface="Arial" pitchFamily="34" charset="0"/>
+                <a:ea typeface="Arial" pitchFamily="34" charset="-122"/>
+                <a:cs typeface="Arial" pitchFamily="34" charset="-120"/>
+              </a:rPr>
+              <a:t>Utility rates are historically rising at 4-6% per year.</a:t>
+            </a:r>
+            <a:endParaRPr lang="en-US" sz="1800" dirty="0"/>
+          </a:p>
+        </p:txBody>
+      </p:sp>
+      <p:sp>
+        <p:nvSpPr>
+          <p:cNvPr id="4" name="Text 2"/>
+          <p:cNvSpPr/>
+          <p:nvPr/>
+        </p:nvSpPr>
+        <p:spPr>
+          <a:xfrm>
+            <a:off x="507950" y="3551039"/>
+            <a:ext cx="3316325" cy="685800"/>
+          </a:xfrm>
+          <a:prstGeom prst="rect">
+            <a:avLst/>
+          </a:prstGeom>
+          <a:noFill/>
+          <a:ln/>
+        </p:spPr>
+        <p:txBody>
+          <a:bodyPr wrap="square" lIns="0" tIns="0" rIns="0" bIns="0" rtlCol="0" anchor="t"/>
+          <a:lstStyle/>
+          <a:p>
+            <a:pPr algn="l" indent="0" marL="0">
+              <a:lnSpc>
+                <a:spcPts val="2700"/>
+              </a:lnSpc>
+              <a:spcBef>
+                <a:spcPts val="1800"/>
+              </a:spcBef>
+              <a:spcAft>
+                <a:spcPts val="1800"/>
+              </a:spcAft>
+              <a:buNone/>
+            </a:pPr>
+            <a:r>
+              <a:rPr lang="en-US" sz="1800" dirty="0">
+                <a:solidFill>
+                  <a:srgbClr val="CBD5E0"/>
+                </a:solidFill>
+                <a:latin typeface="Arial" pitchFamily="34" charset="0"/>
+                <a:ea typeface="Arial" pitchFamily="34" charset="-122"/>
+                <a:cs typeface="Arial" pitchFamily="34" charset="-120"/>
+              </a:rPr>
+              <a:t>Doing nothing isn't free. It's the most expensive option.</a:t>
+            </a:r>
+            <a:endParaRPr lang="en-US" sz="1800" dirty="0"/>
+          </a:p>
+        </p:txBody>
+      </p:sp>
+      <p:sp>
+        <p:nvSpPr>
+          <p:cNvPr id="5" name="Text 3"/>
+          <p:cNvSpPr/>
+          <p:nvPr/>
+        </p:nvSpPr>
+        <p:spPr>
+          <a:xfrm>
+            <a:off x="4267200" y="0"/>
+            <a:ext cx="4876800" cy="5143500"/>
+          </a:xfrm>
+          <a:prstGeom prst="rect">
+            <a:avLst/>
+          </a:prstGeom>
+          <a:solidFill>
+            <a:srgbClr val="2D3748"/>
+          </a:solidFill>
+          <a:ln/>
+        </p:spPr>
+        <p:txBody>
+          <a:bodyPr wrap="square" rtlCol="0" anchor="ctr"/>
+          <a:lstStyle/>
+          <a:p>
+            <a:pPr indent="0" marL="0">
+              <a:buNone/>
+            </a:pPr>
+            <a:endParaRPr lang="en-US" dirty="0"/>
+          </a:p>
+        </p:txBody>
+      </p:sp>
+      <p:pic>
+        <p:nvPicPr>
+          <p:cNvPr id="6" name="Image 0" descr="C:\Users\12132\Desktop\Antigravity Solar Sales Trainer Agent\solar-trainer\presentation_gen\inflation_curve.png">    </p:cNvPr>
+          <p:cNvPicPr>
+            <a:picLocks noChangeAspect="1"/>
+          </p:cNvPicPr>
+          <p:nvPr/>
+        </p:nvPicPr>
+        <p:blipFill>
+          <a:blip r:embed="rId1"/>
+          <a:stretch>
+            <a:fillRect/>
+          </a:stretch>
+        </p:blipFill>
+        <p:spPr>
+          <a:xfrm>
+            <a:off x="4510980" y="666750"/>
+            <a:ext cx="4389090" cy="3810000"/>
+          </a:xfrm>
+          <a:prstGeom prst="rect">
+            <a:avLst/>
+          </a:prstGeom>
+        </p:spPr>
+      </p:pic>
+    </p:spTree>
+  </p:cSld>
+  <p:clrMapOvr>
+    <a:masterClrMapping/>
+  </p:clrMapOvr>
+</p:sld>
+</file>
+
+<file path=ppt/slides/slide7.xml><?xml version="1.0" encoding="utf-8"?>
+<p:sld xmlns:a="http://schemas.openxmlformats.org/drawingml/2006/main" xmlns:r="http://schemas.openxmlformats.org/officeDocument/2006/relationships" xmlns:p="http://schemas.openxmlformats.org/presentationml/2006/main">
+  <p:cSld name="Slide 7">
+    <p:bg>
+      <p:bgPr>
+        <a:solidFill>
+          <a:srgbClr val="1A202C"/>
+        </a:solidFill>
+      </p:bgPr>
+    </p:bg>
+    <p:spTree>
+      <p:nvGrpSpPr>
+        <p:cNvPr id="1" name=""/>
+        <p:cNvGrpSpPr/>
+        <p:nvPr/>
+      </p:nvGrpSpPr>
+      <p:grpSpPr>
+        <a:xfrm>
+          <a:off x="0" y="0"/>
+          <a:ext cx="0" cy="0"/>
+          <a:chOff x="0" y="0"/>
+          <a:chExt cx="0" cy="0"/>
+        </a:xfrm>
+      </p:grpSpPr>
+      <p:sp>
+        <p:nvSpPr>
+          <p:cNvPr id="2" name="Text 0"/>
+          <p:cNvSpPr/>
+          <p:nvPr/>
+        </p:nvSpPr>
+        <p:spPr>
+          <a:xfrm>
+            <a:off x="0" y="0"/>
+            <a:ext cx="9144000" cy="771525"/>
+          </a:xfrm>
+          <a:prstGeom prst="rect">
+            <a:avLst/>
+          </a:prstGeom>
+          <a:solidFill>
+            <a:srgbClr val="2D3748"/>
+          </a:solidFill>
+          <a:ln/>
+        </p:spPr>
+        <p:txBody>
+          <a:bodyPr wrap="square" rtlCol="0" anchor="ctr"/>
+          <a:lstStyle/>
+          <a:p>
+            <a:pPr indent="0" marL="0">
+              <a:buNone/>
+            </a:pPr>
+            <a:endParaRPr lang="en-US" dirty="0"/>
+          </a:p>
+        </p:txBody>
+      </p:sp>
+      <p:sp>
+        <p:nvSpPr>
+          <p:cNvPr id="3" name="Text 1"/>
+          <p:cNvSpPr/>
+          <p:nvPr/>
+        </p:nvSpPr>
+        <p:spPr>
+          <a:xfrm>
+            <a:off x="507950" y="171450"/>
+            <a:ext cx="4537139" cy="428625"/>
+          </a:xfrm>
+          <a:prstGeom prst="rect">
+            <a:avLst/>
+          </a:prstGeom>
+          <a:noFill/>
+          <a:ln/>
+        </p:spPr>
+        <p:txBody>
+          <a:bodyPr wrap="square" lIns="0" tIns="0" rIns="0" bIns="0" rtlCol="0" anchor="t"/>
+          <a:lstStyle/>
+          <a:p>
+            <a:pPr algn="l" indent="0" marL="0">
+              <a:buNone/>
+            </a:pPr>
+            <a:r>
+              <a:rPr lang="en-US" sz="2800" b="1" dirty="0">
+                <a:solidFill>
+                  <a:srgbClr val="63B3ED"/>
+                </a:solidFill>
+                <a:latin typeface="Arial" pitchFamily="34" charset="0"/>
+                <a:ea typeface="Arial" pitchFamily="34" charset="-122"/>
+                <a:cs typeface="Arial" pitchFamily="34" charset="-120"/>
+              </a:rPr>
+              <a:t>The 3 Pillars of Ownership</a:t>
+            </a:r>
+            <a:endParaRPr lang="en-US" sz="2800" dirty="0"/>
+          </a:p>
+        </p:txBody>
+      </p:sp>
+      <p:pic>
+        <p:nvPicPr>
+          <p:cNvPr id="4" name="Image 0" descr="C:\Users\12132\Desktop\Antigravity Solar Sales Trainer Agent\solar-trainer\presentation_gen\three_reasons_shield.png">    </p:cNvPr>
+          <p:cNvPicPr>
+            <a:picLocks noChangeAspect="1"/>
+          </p:cNvPicPr>
+          <p:nvPr/>
+        </p:nvPicPr>
+        <p:blipFill>
+          <a:blip r:embed="rId1"/>
+          <a:stretch>
+            <a:fillRect/>
+          </a:stretch>
+        </p:blipFill>
+        <p:spPr>
+          <a:xfrm>
+            <a:off x="762000" y="1052513"/>
+            <a:ext cx="7620000" cy="3810000"/>
+          </a:xfrm>
+          <a:prstGeom prst="rect">
+            <a:avLst/>
+          </a:prstGeom>
+        </p:spPr>
+      </p:pic>
+    </p:spTree>
+  </p:cSld>
+  <p:clrMapOvr>
+    <a:masterClrMapping/>
+  </p:clrMapOvr>
+</p:sld>
+</file>
+
+<file path=ppt/slides/slide8.xml><?xml version="1.0" encoding="utf-8"?>
+<p:sld xmlns:a="http://schemas.openxmlformats.org/drawingml/2006/main" xmlns:r="http://schemas.openxmlformats.org/officeDocument/2006/relationships" xmlns:p="http://schemas.openxmlformats.org/presentationml/2006/main">
+  <p:cSld name="Slide 8">
+    <p:bg>
+      <p:bgPr>
+        <a:solidFill>
+          <a:srgbClr val="1A202C"/>
+        </a:solidFill>
+      </p:bgPr>
+    </p:bg>
+    <p:spTree>
+      <p:nvGrpSpPr>
+        <p:cNvPr id="1" name=""/>
+        <p:cNvGrpSpPr/>
+        <p:nvPr/>
+      </p:nvGrpSpPr>
+      <p:grpSpPr>
+        <a:xfrm>
+          <a:off x="0" y="0"/>
+          <a:ext cx="0" cy="0"/>
+          <a:chOff x="0" y="0"/>
+          <a:chExt cx="0" cy="0"/>
+        </a:xfrm>
+      </p:grpSpPr>
+      <p:sp>
+        <p:nvSpPr>
+          <p:cNvPr id="2" name="Text 0"/>
+          <p:cNvSpPr/>
+          <p:nvPr/>
+        </p:nvSpPr>
+        <p:spPr>
+          <a:xfrm>
+            <a:off x="507950" y="663476"/>
+            <a:ext cx="4145331" cy="495300"/>
           </a:xfrm>
           <a:prstGeom prst="rect">
             <a:avLst/>
@@ -2135,25 +4978,223 @@
           <a:p>
             <a:pPr algn="l" indent="0" marL="0">
               <a:spcBef>
-                <a:spcPts val="1200"/>
+                <a:spcPts val="2144"/>
               </a:spcBef>
               <a:spcAft>
-                <a:spcPts val="1200"/>
-              </a:spcAft>
-              <a:buNone/>
-            </a:pPr>
-            <a:r>
-              <a:rPr lang="en-US" sz="1200" dirty="0">
-                <a:solidFill>
-                  <a:srgbClr val="FFFFFF"/>
-                </a:solidFill>
-                <a:latin typeface="Arial" pitchFamily="34" charset="0"/>
-                <a:ea typeface="Arial" pitchFamily="34" charset="-122"/>
-                <a:cs typeface="Arial" pitchFamily="34" charset="-120"/>
-              </a:rPr>
-              <a:t>Step 1: Prequalification</a:t>
-            </a:r>
-            <a:endParaRPr lang="en-US" sz="1200" dirty="0"/>
+                <a:spcPts val="2000"/>
+              </a:spcAft>
+              <a:buNone/>
+            </a:pPr>
+            <a:r>
+              <a:rPr lang="en-US" sz="3200" b="1" dirty="0">
+                <a:solidFill>
+                  <a:srgbClr val="F6AD55"/>
+                </a:solidFill>
+                <a:latin typeface="Arial" pitchFamily="34" charset="0"/>
+                <a:ea typeface="Arial" pitchFamily="34" charset="-122"/>
+                <a:cs typeface="Arial" pitchFamily="34" charset="-120"/>
+              </a:rPr>
+              <a:t>The Value Stack</a:t>
+            </a:r>
+            <a:endParaRPr lang="en-US" sz="3200" dirty="0"/>
+          </a:p>
+        </p:txBody>
+      </p:sp>
+      <p:sp>
+        <p:nvSpPr>
+          <p:cNvPr id="3" name="Text 1"/>
+          <p:cNvSpPr/>
+          <p:nvPr/>
+        </p:nvSpPr>
+        <p:spPr>
+          <a:xfrm>
+            <a:off x="507950" y="1666577"/>
+            <a:ext cx="4064050" cy="2831902"/>
+          </a:xfrm>
+          <a:prstGeom prst="rect">
+            <a:avLst/>
+          </a:prstGeom>
+          <a:noFill/>
+          <a:ln/>
+        </p:spPr>
+        <p:txBody>
+          <a:bodyPr wrap="square" lIns="127000" tIns="0" rIns="0" bIns="0" rtlCol="0" anchor="t"/>
+          <a:lstStyle/>
+          <a:p>
+            <a:pPr algn="l" marL="127000" indent="-127000">
+              <a:lnSpc>
+                <a:spcPts val="3600"/>
+              </a:lnSpc>
+              <a:spcAft>
+                <a:spcPts val="1000"/>
+              </a:spcAft>
+              <a:buSzPct val="100000"/>
+              <a:buChar char="•"/>
+            </a:pPr>
+            <a:r>
+              <a:rPr lang="en-US" sz="2000" b="1" dirty="0">
+                <a:solidFill>
+                  <a:srgbClr val="CBD5E0"/>
+                </a:solidFill>
+                <a:latin typeface="Arial" pitchFamily="34" charset="0"/>
+                <a:ea typeface="Arial" pitchFamily="34" charset="-122"/>
+                <a:cs typeface="Arial" pitchFamily="34" charset="-120"/>
+              </a:rPr>
+              <a:t>Fixed Cost:</a:t>
+            </a:r>
+            <a:pPr algn="l" indent="0" marL="0">
+              <a:lnSpc>
+                <a:spcPts val="3600"/>
+              </a:lnSpc>
+              <a:spcAft>
+                <a:spcPts val="1000"/>
+              </a:spcAft>
+              <a:buNone/>
+            </a:pPr>
+            <a:r>
+              <a:rPr lang="en-US" sz="2000" dirty="0">
+                <a:solidFill>
+                  <a:srgbClr val="CBD5E0"/>
+                </a:solidFill>
+                <a:latin typeface="Arial" pitchFamily="34" charset="0"/>
+                <a:ea typeface="Arial" pitchFamily="34" charset="-122"/>
+                <a:cs typeface="Arial" pitchFamily="34" charset="-120"/>
+              </a:rPr>
+              <a:t> Inflation Proof</a:t>
+            </a:r>
+            <a:endParaRPr lang="en-US" sz="2000" dirty="0"/>
+          </a:p>
+          <a:p>
+            <a:pPr algn="l" marL="127000" indent="-127000">
+              <a:lnSpc>
+                <a:spcPts val="3600"/>
+              </a:lnSpc>
+              <a:spcAft>
+                <a:spcPts val="1000"/>
+              </a:spcAft>
+              <a:buSzPct val="100000"/>
+              <a:buChar char="•"/>
+            </a:pPr>
+            <a:r>
+              <a:rPr lang="en-US" sz="2000" b="1" dirty="0">
+                <a:solidFill>
+                  <a:srgbClr val="CBD5E0"/>
+                </a:solidFill>
+                <a:latin typeface="Arial" pitchFamily="34" charset="0"/>
+                <a:ea typeface="Arial" pitchFamily="34" charset="-122"/>
+                <a:cs typeface="Arial" pitchFamily="34" charset="-120"/>
+              </a:rPr>
+              <a:t>Equity:</a:t>
+            </a:r>
+            <a:pPr algn="l" indent="0" marL="0">
+              <a:lnSpc>
+                <a:spcPts val="3600"/>
+              </a:lnSpc>
+              <a:spcAft>
+                <a:spcPts val="1000"/>
+              </a:spcAft>
+              <a:buNone/>
+            </a:pPr>
+            <a:r>
+              <a:rPr lang="en-US" sz="2000" dirty="0">
+                <a:solidFill>
+                  <a:srgbClr val="CBD5E0"/>
+                </a:solidFill>
+                <a:latin typeface="Arial" pitchFamily="34" charset="0"/>
+                <a:ea typeface="Arial" pitchFamily="34" charset="-122"/>
+                <a:cs typeface="Arial" pitchFamily="34" charset="-120"/>
+              </a:rPr>
+              <a:t> ~4% Home Value Increase</a:t>
+            </a:r>
+            <a:endParaRPr lang="en-US" sz="2000" dirty="0"/>
+          </a:p>
+          <a:p>
+            <a:pPr algn="l" marL="127000" indent="-127000">
+              <a:lnSpc>
+                <a:spcPts val="3600"/>
+              </a:lnSpc>
+              <a:spcAft>
+                <a:spcPts val="1000"/>
+              </a:spcAft>
+              <a:buSzPct val="100000"/>
+              <a:buChar char="•"/>
+            </a:pPr>
+            <a:r>
+              <a:rPr lang="en-US" sz="2000" b="1" dirty="0">
+                <a:solidFill>
+                  <a:srgbClr val="CBD5E0"/>
+                </a:solidFill>
+                <a:latin typeface="Arial" pitchFamily="34" charset="0"/>
+                <a:ea typeface="Arial" pitchFamily="34" charset="-122"/>
+                <a:cs typeface="Arial" pitchFamily="34" charset="-120"/>
+              </a:rPr>
+              <a:t>Incentives:</a:t>
+            </a:r>
+            <a:pPr algn="l" indent="0" marL="0">
+              <a:lnSpc>
+                <a:spcPts val="3600"/>
+              </a:lnSpc>
+              <a:spcAft>
+                <a:spcPts val="1000"/>
+              </a:spcAft>
+              <a:buNone/>
+            </a:pPr>
+            <a:r>
+              <a:rPr lang="en-US" sz="2000" dirty="0">
+                <a:solidFill>
+                  <a:srgbClr val="CBD5E0"/>
+                </a:solidFill>
+                <a:latin typeface="Arial" pitchFamily="34" charset="0"/>
+                <a:ea typeface="Arial" pitchFamily="34" charset="-122"/>
+                <a:cs typeface="Arial" pitchFamily="34" charset="-120"/>
+              </a:rPr>
+              <a:t> 30% Federal ITC</a:t>
+            </a:r>
+            <a:endParaRPr lang="en-US" sz="2000" dirty="0"/>
+          </a:p>
+          <a:p>
+            <a:pPr algn="l" marL="127000" indent="-127000">
+              <a:lnSpc>
+                <a:spcPts val="3600"/>
+              </a:lnSpc>
+              <a:spcAft>
+                <a:spcPts val="1000"/>
+              </a:spcAft>
+              <a:buSzPct val="100000"/>
+              <a:buChar char="•"/>
+            </a:pPr>
+            <a:r>
+              <a:rPr lang="en-US" sz="2000" b="1" dirty="0">
+                <a:solidFill>
+                  <a:srgbClr val="CBD5E0"/>
+                </a:solidFill>
+                <a:latin typeface="Arial" pitchFamily="34" charset="0"/>
+                <a:ea typeface="Arial" pitchFamily="34" charset="-122"/>
+                <a:cs typeface="Arial" pitchFamily="34" charset="-120"/>
+              </a:rPr>
+              <a:t>Control:</a:t>
+            </a:r>
+            <a:pPr algn="l" indent="0" marL="0">
+              <a:lnSpc>
+                <a:spcPts val="3600"/>
+              </a:lnSpc>
+              <a:spcAft>
+                <a:spcPts val="1000"/>
+              </a:spcAft>
+              <a:buNone/>
+            </a:pPr>
+            <a:r>
+              <a:rPr lang="en-US" sz="2000" dirty="0">
+                <a:solidFill>
+                  <a:srgbClr val="CBD5E0"/>
+                </a:solidFill>
+                <a:latin typeface="Arial" pitchFamily="34" charset="0"/>
+                <a:ea typeface="Arial" pitchFamily="34" charset="-122"/>
+                <a:cs typeface="Arial" pitchFamily="34" charset="-120"/>
+              </a:rPr>
+              <a:t> Own vs Rent</a:t>
+            </a:r>
+            <a:endParaRPr lang="en-US" sz="2000" dirty="0"/>
           </a:p>
         </p:txBody>
       </p:sp>
@@ -2165,8 +5206,94 @@
         </p:nvSpPr>
         <p:spPr>
           <a:xfrm>
-            <a:off x="3800475" y="2820888"/>
-            <a:ext cx="1573911" cy="180975"/>
+            <a:off x="5079950" y="0"/>
+            <a:ext cx="4064050" cy="5143500"/>
+          </a:xfrm>
+          <a:prstGeom prst="rect">
+            <a:avLst/>
+          </a:prstGeom>
+          <a:solidFill>
+            <a:srgbClr val="2D3748"/>
+          </a:solidFill>
+          <a:ln/>
+        </p:spPr>
+        <p:txBody>
+          <a:bodyPr wrap="square" rtlCol="0" anchor="ctr"/>
+          <a:lstStyle/>
+          <a:p>
+            <a:pPr indent="0" marL="0">
+              <a:buNone/>
+            </a:pPr>
+            <a:endParaRPr lang="en-US" dirty="0"/>
+          </a:p>
+        </p:txBody>
+      </p:sp>
+      <p:pic>
+        <p:nvPicPr>
+          <p:cNvPr id="5" name="Image 0" descr="C:\Users\12132\Desktop\Antigravity Solar Sales Trainer Agent\solar-trainer\presentation_gen\value_stack_pyramid.png">    </p:cNvPr>
+          <p:cNvPicPr>
+            <a:picLocks noChangeAspect="1"/>
+          </p:cNvPicPr>
+          <p:nvPr/>
+        </p:nvPicPr>
+        <p:blipFill>
+          <a:blip r:embed="rId1"/>
+          <a:stretch>
+            <a:fillRect/>
+          </a:stretch>
+        </p:blipFill>
+        <p:spPr>
+          <a:xfrm>
+            <a:off x="5283101" y="666750"/>
+            <a:ext cx="3657600" cy="3810000"/>
+          </a:xfrm>
+          <a:prstGeom prst="rect">
+            <a:avLst/>
+          </a:prstGeom>
+        </p:spPr>
+      </p:pic>
+    </p:spTree>
+  </p:cSld>
+  <p:clrMapOvr>
+    <a:masterClrMapping/>
+  </p:clrMapOvr>
+</p:sld>
+</file>
+
+<file path=ppt/slides/slide9.xml><?xml version="1.0" encoding="utf-8"?>
+<p:sld xmlns:a="http://schemas.openxmlformats.org/drawingml/2006/main" xmlns:r="http://schemas.openxmlformats.org/officeDocument/2006/relationships" xmlns:p="http://schemas.openxmlformats.org/presentationml/2006/main">
+  <p:cSld name="Slide 9">
+    <p:bg>
+      <p:bgPr>
+        <a:solidFill>
+          <a:srgbClr val="1A202C"/>
+        </a:solidFill>
+      </p:bgPr>
+    </p:bg>
+    <p:spTree>
+      <p:nvGrpSpPr>
+        <p:cNvPr id="1" name=""/>
+        <p:cNvGrpSpPr/>
+        <p:nvPr/>
+      </p:nvGrpSpPr>
+      <p:grpSpPr>
+        <a:xfrm>
+          <a:off x="0" y="0"/>
+          <a:ext cx="0" cy="0"/>
+          <a:chOff x="0" y="0"/>
+          <a:chExt cx="0" cy="0"/>
+        </a:xfrm>
+      </p:grpSpPr>
+      <p:sp>
+        <p:nvSpPr>
+          <p:cNvPr id="2" name="Text 0"/>
+          <p:cNvSpPr/>
+          <p:nvPr/>
+        </p:nvSpPr>
+        <p:spPr>
+          <a:xfrm>
+            <a:off x="381000" y="1192113"/>
+            <a:ext cx="4274820" cy="428625"/>
           </a:xfrm>
           <a:prstGeom prst="rect">
             <a:avLst/>
@@ -2180,38 +5307,38 @@
           <a:p>
             <a:pPr algn="l" indent="0" marL="0">
               <a:spcBef>
-                <a:spcPts val="1200"/>
+                <a:spcPts val="1876"/>
               </a:spcBef>
               <a:spcAft>
-                <a:spcPts val="1200"/>
-              </a:spcAft>
-              <a:buNone/>
-            </a:pPr>
-            <a:r>
-              <a:rPr lang="en-US" sz="1200" dirty="0">
-                <a:solidFill>
-                  <a:srgbClr val="FFFFFF"/>
-                </a:solidFill>
-                <a:latin typeface="Arial" pitchFamily="34" charset="0"/>
-                <a:ea typeface="Arial" pitchFamily="34" charset="-122"/>
-                <a:cs typeface="Arial" pitchFamily="34" charset="-120"/>
-              </a:rPr>
-              <a:t>Step 2: Custom Design</a:t>
-            </a:r>
-            <a:endParaRPr lang="en-US" sz="1200" dirty="0"/>
-          </a:p>
-        </p:txBody>
-      </p:sp>
-      <p:sp>
-        <p:nvSpPr>
-          <p:cNvPr id="5" name="Text 3"/>
-          <p:cNvSpPr/>
-          <p:nvPr/>
-        </p:nvSpPr>
-        <p:spPr>
-          <a:xfrm>
-            <a:off x="3938588" y="3306663"/>
-            <a:ext cx="1292162" cy="180975"/>
+                <a:spcPts val="1500"/>
+              </a:spcAft>
+              <a:buNone/>
+            </a:pPr>
+            <a:r>
+              <a:rPr lang="en-US" sz="2800" b="1" dirty="0">
+                <a:solidFill>
+                  <a:srgbClr val="FC8181"/>
+                </a:solidFill>
+                <a:latin typeface="Arial" pitchFamily="34" charset="0"/>
+                <a:ea typeface="Arial" pitchFamily="34" charset="-122"/>
+                <a:cs typeface="Arial" pitchFamily="34" charset="-120"/>
+              </a:rPr>
+              <a:t>Common Questions</a:t>
+            </a:r>
+            <a:endParaRPr lang="en-US" sz="2800" dirty="0"/>
+          </a:p>
+        </p:txBody>
+      </p:sp>
+      <p:sp>
+        <p:nvSpPr>
+          <p:cNvPr id="3" name="Text 1"/>
+          <p:cNvSpPr/>
+          <p:nvPr/>
+        </p:nvSpPr>
+        <p:spPr>
+          <a:xfrm>
+            <a:off x="381000" y="1988939"/>
+            <a:ext cx="4274820" cy="219075"/>
           </a:xfrm>
           <a:prstGeom prst="rect">
             <a:avLst/>
@@ -2225,23 +5352,65 @@
           <a:p>
             <a:pPr algn="l" indent="0" marL="0">
               <a:spcBef>
-                <a:spcPts val="1200"/>
+                <a:spcPts val="1400"/>
               </a:spcBef>
               <a:spcAft>
-                <a:spcPts val="1200"/>
-              </a:spcAft>
+                <a:spcPts val="200"/>
+              </a:spcAft>
+              <a:buNone/>
+            </a:pPr>
+            <a:r>
+              <a:rPr lang="en-US" sz="1400" b="1" dirty="0">
+                <a:solidFill>
+                  <a:srgbClr val="F6AD55"/>
+                </a:solidFill>
+                <a:latin typeface="Arial" pitchFamily="34" charset="0"/>
+                <a:ea typeface="Arial" pitchFamily="34" charset="-122"/>
+                <a:cs typeface="Arial" pitchFamily="34" charset="-120"/>
+              </a:rPr>
+              <a:t>Q: What are the upfront costs?</a:t>
+            </a:r>
+            <a:endParaRPr lang="en-US" sz="1400" dirty="0"/>
+          </a:p>
+        </p:txBody>
+      </p:sp>
+      <p:sp>
+        <p:nvSpPr>
+          <p:cNvPr id="4" name="Text 2"/>
+          <p:cNvSpPr/>
+          <p:nvPr/>
+        </p:nvSpPr>
+        <p:spPr>
+          <a:xfrm>
+            <a:off x="381000" y="2233315"/>
+            <a:ext cx="4274820" cy="182761"/>
+          </a:xfrm>
+          <a:prstGeom prst="rect">
+            <a:avLst/>
+          </a:prstGeom>
+          <a:noFill/>
+          <a:ln/>
+        </p:spPr>
+        <p:txBody>
+          <a:bodyPr wrap="square" lIns="0" tIns="0" rIns="0" bIns="0" rtlCol="0" anchor="t"/>
+          <a:lstStyle/>
+          <a:p>
+            <a:pPr algn="l" indent="0" marL="0">
+              <a:lnSpc>
+                <a:spcPts val="1440"/>
+              </a:lnSpc>
               <a:buNone/>
             </a:pPr>
             <a:r>
               <a:rPr lang="en-US" sz="1200" dirty="0">
                 <a:solidFill>
-                  <a:srgbClr val="FFFFFF"/>
-                </a:solidFill>
-                <a:latin typeface="Arial" pitchFamily="34" charset="0"/>
-                <a:ea typeface="Arial" pitchFamily="34" charset="-122"/>
-                <a:cs typeface="Arial" pitchFamily="34" charset="-120"/>
-              </a:rPr>
-              <a:t>Step 3: Site Survey</a:t>
+                  <a:srgbClr val="CBD5E0"/>
+                </a:solidFill>
+                <a:latin typeface="Arial" pitchFamily="34" charset="0"/>
+                <a:ea typeface="Arial" pitchFamily="34" charset="-122"/>
+                <a:cs typeface="Arial" pitchFamily="34" charset="-120"/>
+              </a:rPr>
+              <a:t>A: $0 Down. You only pay when the system is producing power.</a:t>
             </a:r>
             <a:endParaRPr lang="en-US" sz="1200" dirty="0"/>
           </a:p>
@@ -2249,14 +5418,14 @@
       </p:sp>
       <p:sp>
         <p:nvSpPr>
-          <p:cNvPr id="6" name="Text 4"/>
-          <p:cNvSpPr/>
-          <p:nvPr/>
-        </p:nvSpPr>
-        <p:spPr>
-          <a:xfrm>
-            <a:off x="3852863" y="3792438"/>
-            <a:ext cx="1467041" cy="180975"/>
+          <p:cNvPr id="5" name="Text 3"/>
+          <p:cNvSpPr/>
+          <p:nvPr/>
+        </p:nvSpPr>
+        <p:spPr>
+          <a:xfrm>
+            <a:off x="381000" y="2720727"/>
+            <a:ext cx="4274820" cy="219075"/>
           </a:xfrm>
           <a:prstGeom prst="rect">
             <a:avLst/>
@@ -2270,25 +5439,229 @@
           <a:p>
             <a:pPr algn="l" indent="0" marL="0">
               <a:spcBef>
-                <a:spcPts val="1200"/>
+                <a:spcPts val="1400"/>
               </a:spcBef>
               <a:spcAft>
-                <a:spcPts val="1200"/>
-              </a:spcAft>
+                <a:spcPts val="200"/>
+              </a:spcAft>
+              <a:buNone/>
+            </a:pPr>
+            <a:r>
+              <a:rPr lang="en-US" sz="1400" b="1" dirty="0">
+                <a:solidFill>
+                  <a:srgbClr val="F6AD55"/>
+                </a:solidFill>
+                <a:latin typeface="Arial" pitchFamily="34" charset="0"/>
+                <a:ea typeface="Arial" pitchFamily="34" charset="-122"/>
+                <a:cs typeface="Arial" pitchFamily="34" charset="-120"/>
+              </a:rPr>
+              <a:t>Q: What if I sell my home?</a:t>
+            </a:r>
+            <a:endParaRPr lang="en-US" sz="1400" dirty="0"/>
+          </a:p>
+        </p:txBody>
+      </p:sp>
+      <p:sp>
+        <p:nvSpPr>
+          <p:cNvPr id="6" name="Text 4"/>
+          <p:cNvSpPr/>
+          <p:nvPr/>
+        </p:nvSpPr>
+        <p:spPr>
+          <a:xfrm>
+            <a:off x="381000" y="2965103"/>
+            <a:ext cx="4274820" cy="182761"/>
+          </a:xfrm>
+          <a:prstGeom prst="rect">
+            <a:avLst/>
+          </a:prstGeom>
+          <a:noFill/>
+          <a:ln/>
+        </p:spPr>
+        <p:txBody>
+          <a:bodyPr wrap="square" lIns="0" tIns="0" rIns="0" bIns="0" rtlCol="0" anchor="t"/>
+          <a:lstStyle/>
+          <a:p>
+            <a:pPr algn="l" indent="0" marL="0">
+              <a:lnSpc>
+                <a:spcPts val="1440"/>
+              </a:lnSpc>
               <a:buNone/>
             </a:pPr>
             <a:r>
               <a:rPr lang="en-US" sz="1200" dirty="0">
                 <a:solidFill>
+                  <a:srgbClr val="CBD5E0"/>
+                </a:solidFill>
+                <a:latin typeface="Arial" pitchFamily="34" charset="0"/>
+                <a:ea typeface="Arial" pitchFamily="34" charset="-122"/>
+                <a:cs typeface="Arial" pitchFamily="34" charset="-120"/>
+              </a:rPr>
+              <a:t>A: Transfer the agreement OR pay it off to increase home equity.</a:t>
+            </a:r>
+            <a:endParaRPr lang="en-US" sz="1200" dirty="0"/>
+          </a:p>
+        </p:txBody>
+      </p:sp>
+      <p:sp>
+        <p:nvSpPr>
+          <p:cNvPr id="7" name="Text 5"/>
+          <p:cNvSpPr/>
+          <p:nvPr/>
+        </p:nvSpPr>
+        <p:spPr>
+          <a:xfrm>
+            <a:off x="381000" y="3452515"/>
+            <a:ext cx="4274820" cy="219075"/>
+          </a:xfrm>
+          <a:prstGeom prst="rect">
+            <a:avLst/>
+          </a:prstGeom>
+          <a:noFill/>
+          <a:ln/>
+        </p:spPr>
+        <p:txBody>
+          <a:bodyPr wrap="square" lIns="0" tIns="0" rIns="0" bIns="0" rtlCol="0" anchor="t"/>
+          <a:lstStyle/>
+          <a:p>
+            <a:pPr algn="l" indent="0" marL="0">
+              <a:spcBef>
+                <a:spcPts val="1400"/>
+              </a:spcBef>
+              <a:spcAft>
+                <a:spcPts val="200"/>
+              </a:spcAft>
+              <a:buNone/>
+            </a:pPr>
+            <a:r>
+              <a:rPr lang="en-US" sz="1400" b="1" dirty="0">
+                <a:solidFill>
+                  <a:srgbClr val="F6AD55"/>
+                </a:solidFill>
+                <a:latin typeface="Arial" pitchFamily="34" charset="0"/>
+                <a:ea typeface="Arial" pitchFamily="34" charset="-122"/>
+                <a:cs typeface="Arial" pitchFamily="34" charset="-120"/>
+              </a:rPr>
+              <a:t>Q: What about warranties?</a:t>
+            </a:r>
+            <a:endParaRPr lang="en-US" sz="1400" dirty="0"/>
+          </a:p>
+        </p:txBody>
+      </p:sp>
+      <p:sp>
+        <p:nvSpPr>
+          <p:cNvPr id="8" name="Text 6"/>
+          <p:cNvSpPr/>
+          <p:nvPr/>
+        </p:nvSpPr>
+        <p:spPr>
+          <a:xfrm>
+            <a:off x="381000" y="3696891"/>
+            <a:ext cx="4274820" cy="365522"/>
+          </a:xfrm>
+          <a:prstGeom prst="rect">
+            <a:avLst/>
+          </a:prstGeom>
+          <a:noFill/>
+          <a:ln/>
+        </p:spPr>
+        <p:txBody>
+          <a:bodyPr wrap="square" lIns="0" tIns="0" rIns="0" bIns="0" rtlCol="0" anchor="t"/>
+          <a:lstStyle/>
+          <a:p>
+            <a:pPr algn="l" indent="0" marL="0">
+              <a:lnSpc>
+                <a:spcPts val="1440"/>
+              </a:lnSpc>
+              <a:buNone/>
+            </a:pPr>
+            <a:r>
+              <a:rPr lang="en-US" sz="1200" dirty="0">
+                <a:solidFill>
+                  <a:srgbClr val="CBD5E0"/>
+                </a:solidFill>
+                <a:latin typeface="Arial" pitchFamily="34" charset="0"/>
+                <a:ea typeface="Arial" pitchFamily="34" charset="-122"/>
+                <a:cs typeface="Arial" pitchFamily="34" charset="-120"/>
+              </a:rPr>
+              <a:t>A: 25-Year Production, Workmanship, and Roof Penetration Warranty.</a:t>
+            </a:r>
+            <a:endParaRPr lang="en-US" sz="1200" dirty="0"/>
+          </a:p>
+        </p:txBody>
+      </p:sp>
+      <p:sp>
+        <p:nvSpPr>
+          <p:cNvPr id="9" name="Text 7"/>
+          <p:cNvSpPr/>
+          <p:nvPr/>
+        </p:nvSpPr>
+        <p:spPr>
+          <a:xfrm>
+            <a:off x="4953000" y="0"/>
+            <a:ext cx="4191000" cy="5143500"/>
+          </a:xfrm>
+          <a:prstGeom prst="rect">
+            <a:avLst/>
+          </a:prstGeom>
+          <a:solidFill>
+            <a:srgbClr val="2D3748"/>
+          </a:solidFill>
+          <a:ln/>
+        </p:spPr>
+        <p:txBody>
+          <a:bodyPr wrap="square" rtlCol="0" anchor="ctr"/>
+          <a:lstStyle/>
+          <a:p>
+            <a:pPr indent="0" marL="0">
+              <a:buNone/>
+            </a:pPr>
+            <a:endParaRPr lang="en-US" dirty="0"/>
+          </a:p>
+        </p:txBody>
+      </p:sp>
+      <p:sp>
+        <p:nvSpPr>
+          <p:cNvPr id="10" name="Text 8"/>
+          <p:cNvSpPr/>
+          <p:nvPr/>
+        </p:nvSpPr>
+        <p:spPr>
+          <a:xfrm>
+            <a:off x="6176963" y="1728788"/>
+            <a:ext cx="1777937" cy="1685925"/>
+          </a:xfrm>
+          <a:prstGeom prst="rect">
+            <a:avLst/>
+          </a:prstGeom>
+          <a:noFill/>
+          <a:ln/>
+        </p:spPr>
+        <p:txBody>
+          <a:bodyPr wrap="square" lIns="0" tIns="0" rIns="0" bIns="0" rtlCol="0" anchor="t"/>
+          <a:lstStyle/>
+          <a:p>
+            <a:pPr algn="l" indent="0" marL="0">
+              <a:spcBef>
+                <a:spcPts val="10000"/>
+              </a:spcBef>
+              <a:spcAft>
+                <a:spcPts val="10000"/>
+              </a:spcAft>
+              <a:buNone/>
+            </a:pPr>
+            <a:r>
+              <a:rPr lang="en-US" sz="10000" dirty="0">
+                <a:solidFill>
                   <a:srgbClr val="FFFFFF"/>
                 </a:solidFill>
                 <a:latin typeface="Arial" pitchFamily="34" charset="0"/>
                 <a:ea typeface="Arial" pitchFamily="34" charset="-122"/>
                 <a:cs typeface="Arial" pitchFamily="34" charset="-120"/>
               </a:rPr>
-              <a:t>Let's see if you qualify</a:t>
-            </a:r>
-            <a:endParaRPr lang="en-US" sz="1200" dirty="0"/>
+              <a:t>❔</a:t>
+            </a:r>
+            <a:endParaRPr lang="en-US" sz="10000" dirty="0"/>
           </a:p>
         </p:txBody>
       </p:sp>

</xml_diff>